<commit_message>
ready for bed the night beforegit add .!
</commit_message>
<xml_diff>
--- a/images/framework.pptx
+++ b/images/framework.pptx
@@ -6,6 +6,12 @@
   </p:sldMasterIdLst>
   <p:sldIdLst>
     <p:sldId id="256" r:id="rId2"/>
+    <p:sldId id="257" r:id="rId3"/>
+    <p:sldId id="259" r:id="rId4"/>
+    <p:sldId id="260" r:id="rId5"/>
+    <p:sldId id="261" r:id="rId6"/>
+    <p:sldId id="262" r:id="rId7"/>
+    <p:sldId id="258" r:id="rId8"/>
   </p:sldIdLst>
   <p:sldSz cx="9144000" cy="6858000" type="screen4x3"/>
   <p:notesSz cx="6858000" cy="9144000"/>
@@ -104,6 +110,11 @@
       </a:defRPr>
     </a:lvl9pPr>
   </p:defaultTextStyle>
+  <p:extLst>
+    <p:ext uri="{EFAFB233-063F-42B5-8137-9DF3F51BA10A}">
+      <p15:sldGuideLst xmlns:p15="http://schemas.microsoft.com/office/powerpoint/2012/main"/>
+    </p:ext>
+  </p:extLst>
 </p:presentation>
 </file>
 
@@ -238,7 +249,7 @@
           <a:p>
             <a:fld id="{2F368651-614B-4D78-94D1-925CBADB3A2B}" type="datetimeFigureOut">
               <a:rPr lang="en-US" smtClean="0"/>
-              <a:t>10/29/2024</a:t>
+              <a:t>11/18/2024</a:t>
             </a:fld>
             <a:endParaRPr lang="en-US"/>
           </a:p>
@@ -408,7 +419,7 @@
           <a:p>
             <a:fld id="{2F368651-614B-4D78-94D1-925CBADB3A2B}" type="datetimeFigureOut">
               <a:rPr lang="en-US" smtClean="0"/>
-              <a:t>10/29/2024</a:t>
+              <a:t>11/18/2024</a:t>
             </a:fld>
             <a:endParaRPr lang="en-US"/>
           </a:p>
@@ -588,7 +599,7 @@
           <a:p>
             <a:fld id="{2F368651-614B-4D78-94D1-925CBADB3A2B}" type="datetimeFigureOut">
               <a:rPr lang="en-US" smtClean="0"/>
-              <a:t>10/29/2024</a:t>
+              <a:t>11/18/2024</a:t>
             </a:fld>
             <a:endParaRPr lang="en-US"/>
           </a:p>
@@ -758,7 +769,7 @@
           <a:p>
             <a:fld id="{2F368651-614B-4D78-94D1-925CBADB3A2B}" type="datetimeFigureOut">
               <a:rPr lang="en-US" smtClean="0"/>
-              <a:t>10/29/2024</a:t>
+              <a:t>11/18/2024</a:t>
             </a:fld>
             <a:endParaRPr lang="en-US"/>
           </a:p>
@@ -1004,7 +1015,7 @@
           <a:p>
             <a:fld id="{2F368651-614B-4D78-94D1-925CBADB3A2B}" type="datetimeFigureOut">
               <a:rPr lang="en-US" smtClean="0"/>
-              <a:t>10/29/2024</a:t>
+              <a:t>11/18/2024</a:t>
             </a:fld>
             <a:endParaRPr lang="en-US"/>
           </a:p>
@@ -1236,7 +1247,7 @@
           <a:p>
             <a:fld id="{2F368651-614B-4D78-94D1-925CBADB3A2B}" type="datetimeFigureOut">
               <a:rPr lang="en-US" smtClean="0"/>
-              <a:t>10/29/2024</a:t>
+              <a:t>11/18/2024</a:t>
             </a:fld>
             <a:endParaRPr lang="en-US"/>
           </a:p>
@@ -1603,7 +1614,7 @@
           <a:p>
             <a:fld id="{2F368651-614B-4D78-94D1-925CBADB3A2B}" type="datetimeFigureOut">
               <a:rPr lang="en-US" smtClean="0"/>
-              <a:t>10/29/2024</a:t>
+              <a:t>11/18/2024</a:t>
             </a:fld>
             <a:endParaRPr lang="en-US"/>
           </a:p>
@@ -1721,7 +1732,7 @@
           <a:p>
             <a:fld id="{2F368651-614B-4D78-94D1-925CBADB3A2B}" type="datetimeFigureOut">
               <a:rPr lang="en-US" smtClean="0"/>
-              <a:t>10/29/2024</a:t>
+              <a:t>11/18/2024</a:t>
             </a:fld>
             <a:endParaRPr lang="en-US"/>
           </a:p>
@@ -1816,7 +1827,7 @@
           <a:p>
             <a:fld id="{2F368651-614B-4D78-94D1-925CBADB3A2B}" type="datetimeFigureOut">
               <a:rPr lang="en-US" smtClean="0"/>
-              <a:t>10/29/2024</a:t>
+              <a:t>11/18/2024</a:t>
             </a:fld>
             <a:endParaRPr lang="en-US"/>
           </a:p>
@@ -2093,7 +2104,7 @@
           <a:p>
             <a:fld id="{2F368651-614B-4D78-94D1-925CBADB3A2B}" type="datetimeFigureOut">
               <a:rPr lang="en-US" smtClean="0"/>
-              <a:t>10/29/2024</a:t>
+              <a:t>11/18/2024</a:t>
             </a:fld>
             <a:endParaRPr lang="en-US"/>
           </a:p>
@@ -2350,7 +2361,7 @@
           <a:p>
             <a:fld id="{2F368651-614B-4D78-94D1-925CBADB3A2B}" type="datetimeFigureOut">
               <a:rPr lang="en-US" smtClean="0"/>
-              <a:t>10/29/2024</a:t>
+              <a:t>11/18/2024</a:t>
             </a:fld>
             <a:endParaRPr lang="en-US"/>
           </a:p>
@@ -2563,7 +2574,7 @@
           <a:p>
             <a:fld id="{2F368651-614B-4D78-94D1-925CBADB3A2B}" type="datetimeFigureOut">
               <a:rPr lang="en-US" smtClean="0"/>
-              <a:t>10/29/2024</a:t>
+              <a:t>11/18/2024</a:t>
             </a:fld>
             <a:endParaRPr lang="en-US"/>
           </a:p>
@@ -3472,6 +3483,3756 @@
     <p:extLst>
       <p:ext uri="{BB962C8B-B14F-4D97-AF65-F5344CB8AC3E}">
         <p14:creationId xmlns:p14="http://schemas.microsoft.com/office/powerpoint/2010/main" val="2464270890"/>
+      </p:ext>
+    </p:extLst>
+  </p:cSld>
+  <p:clrMapOvr>
+    <a:masterClrMapping/>
+  </p:clrMapOvr>
+</p:sld>
+</file>
+
+<file path=ppt/slides/slide2.xml><?xml version="1.0" encoding="utf-8"?>
+<p:sld xmlns:a="http://schemas.openxmlformats.org/drawingml/2006/main" xmlns:r="http://schemas.openxmlformats.org/officeDocument/2006/relationships" xmlns:p="http://schemas.openxmlformats.org/presentationml/2006/main">
+  <p:cSld>
+    <p:spTree>
+      <p:nvGrpSpPr>
+        <p:cNvPr id="1" name=""/>
+        <p:cNvGrpSpPr/>
+        <p:nvPr/>
+      </p:nvGrpSpPr>
+      <p:grpSpPr>
+        <a:xfrm>
+          <a:off x="0" y="0"/>
+          <a:ext cx="0" cy="0"/>
+          <a:chOff x="0" y="0"/>
+          <a:chExt cx="0" cy="0"/>
+        </a:xfrm>
+      </p:grpSpPr>
+      <p:sp>
+        <p:nvSpPr>
+          <p:cNvPr id="5" name="TextBox 4">
+            <a:extLst>
+              <a:ext uri="{FF2B5EF4-FFF2-40B4-BE49-F238E27FC236}">
+                <a16:creationId xmlns:a16="http://schemas.microsoft.com/office/drawing/2014/main" id="{3FBFDCD3-E47B-947B-A7AA-4EA2F4890A1B}"/>
+              </a:ext>
+            </a:extLst>
+          </p:cNvPr>
+          <p:cNvSpPr txBox="1"/>
+          <p:nvPr/>
+        </p:nvSpPr>
+        <p:spPr>
+          <a:xfrm>
+            <a:off x="87085" y="5802086"/>
+            <a:ext cx="4093029" cy="769441"/>
+          </a:xfrm>
+          <a:prstGeom prst="rect">
+            <a:avLst/>
+          </a:prstGeom>
+          <a:noFill/>
+        </p:spPr>
+        <p:txBody>
+          <a:bodyPr wrap="square" rtlCol="0">
+            <a:spAutoFit/>
+          </a:bodyPr>
+          <a:lstStyle/>
+          <a:p>
+            <a:r>
+              <a:rPr lang="en-US" sz="4400" b="1" dirty="0"/>
+              <a:t>MIGRATION</a:t>
+            </a:r>
+          </a:p>
+        </p:txBody>
+      </p:sp>
+      <p:sp>
+        <p:nvSpPr>
+          <p:cNvPr id="6" name="TextBox 5">
+            <a:extLst>
+              <a:ext uri="{FF2B5EF4-FFF2-40B4-BE49-F238E27FC236}">
+                <a16:creationId xmlns:a16="http://schemas.microsoft.com/office/drawing/2014/main" id="{CF305AAF-CAA5-3BD4-7047-1B27F007CB82}"/>
+              </a:ext>
+            </a:extLst>
+          </p:cNvPr>
+          <p:cNvSpPr txBox="1"/>
+          <p:nvPr/>
+        </p:nvSpPr>
+        <p:spPr>
+          <a:xfrm>
+            <a:off x="5464629" y="5802087"/>
+            <a:ext cx="4093029" cy="769441"/>
+          </a:xfrm>
+          <a:prstGeom prst="rect">
+            <a:avLst/>
+          </a:prstGeom>
+          <a:noFill/>
+        </p:spPr>
+        <p:txBody>
+          <a:bodyPr wrap="square" rtlCol="0">
+            <a:spAutoFit/>
+          </a:bodyPr>
+          <a:lstStyle/>
+          <a:p>
+            <a:r>
+              <a:rPr lang="en-US" sz="4400" b="1" dirty="0"/>
+              <a:t>URBANICITY</a:t>
+            </a:r>
+          </a:p>
+        </p:txBody>
+      </p:sp>
+      <p:sp>
+        <p:nvSpPr>
+          <p:cNvPr id="7" name="TextBox 6">
+            <a:extLst>
+              <a:ext uri="{FF2B5EF4-FFF2-40B4-BE49-F238E27FC236}">
+                <a16:creationId xmlns:a16="http://schemas.microsoft.com/office/drawing/2014/main" id="{6EF35BA9-7E81-8C07-08EB-6CEB3392806D}"/>
+              </a:ext>
+            </a:extLst>
+          </p:cNvPr>
+          <p:cNvSpPr txBox="1"/>
+          <p:nvPr/>
+        </p:nvSpPr>
+        <p:spPr>
+          <a:xfrm>
+            <a:off x="5050971" y="286473"/>
+            <a:ext cx="4093029" cy="769441"/>
+          </a:xfrm>
+          <a:prstGeom prst="rect">
+            <a:avLst/>
+          </a:prstGeom>
+          <a:noFill/>
+        </p:spPr>
+        <p:txBody>
+          <a:bodyPr wrap="square" rtlCol="0">
+            <a:spAutoFit/>
+          </a:bodyPr>
+          <a:lstStyle/>
+          <a:p>
+            <a:r>
+              <a:rPr lang="en-US" sz="4400" b="1" dirty="0"/>
+              <a:t>COMPOSITION</a:t>
+            </a:r>
+          </a:p>
+        </p:txBody>
+      </p:sp>
+      <p:cxnSp>
+        <p:nvCxnSpPr>
+          <p:cNvPr id="9" name="Straight Arrow Connector 8">
+            <a:extLst>
+              <a:ext uri="{FF2B5EF4-FFF2-40B4-BE49-F238E27FC236}">
+                <a16:creationId xmlns:a16="http://schemas.microsoft.com/office/drawing/2014/main" id="{AFD4E18F-821D-ABEA-9FC2-877F675B2E1A}"/>
+              </a:ext>
+            </a:extLst>
+          </p:cNvPr>
+          <p:cNvCxnSpPr>
+            <a:cxnSpLocks/>
+            <a:endCxn id="7" idx="1"/>
+          </p:cNvCxnSpPr>
+          <p:nvPr/>
+        </p:nvCxnSpPr>
+        <p:spPr>
+          <a:xfrm>
+            <a:off x="2852057" y="671193"/>
+            <a:ext cx="2198914" cy="1"/>
+          </a:xfrm>
+          <a:prstGeom prst="straightConnector1">
+            <a:avLst/>
+          </a:prstGeom>
+          <a:ln w="76200">
+            <a:headEnd type="triangle"/>
+            <a:tailEnd type="triangle"/>
+          </a:ln>
+        </p:spPr>
+        <p:style>
+          <a:lnRef idx="2">
+            <a:schemeClr val="dk1"/>
+          </a:lnRef>
+          <a:fillRef idx="0">
+            <a:schemeClr val="dk1"/>
+          </a:fillRef>
+          <a:effectRef idx="1">
+            <a:schemeClr val="dk1"/>
+          </a:effectRef>
+          <a:fontRef idx="minor">
+            <a:schemeClr val="tx1"/>
+          </a:fontRef>
+        </p:style>
+      </p:cxnSp>
+      <p:cxnSp>
+        <p:nvCxnSpPr>
+          <p:cNvPr id="15" name="Straight Arrow Connector 14">
+            <a:extLst>
+              <a:ext uri="{FF2B5EF4-FFF2-40B4-BE49-F238E27FC236}">
+                <a16:creationId xmlns:a16="http://schemas.microsoft.com/office/drawing/2014/main" id="{E631577A-52FE-2D72-7F86-5362A234D85F}"/>
+              </a:ext>
+            </a:extLst>
+          </p:cNvPr>
+          <p:cNvCxnSpPr>
+            <a:cxnSpLocks/>
+          </p:cNvCxnSpPr>
+          <p:nvPr/>
+        </p:nvCxnSpPr>
+        <p:spPr>
+          <a:xfrm>
+            <a:off x="3254829" y="6186806"/>
+            <a:ext cx="2198914" cy="1"/>
+          </a:xfrm>
+          <a:prstGeom prst="straightConnector1">
+            <a:avLst/>
+          </a:prstGeom>
+          <a:ln w="76200">
+            <a:headEnd type="triangle"/>
+            <a:tailEnd type="triangle"/>
+          </a:ln>
+        </p:spPr>
+        <p:style>
+          <a:lnRef idx="2">
+            <a:schemeClr val="dk1"/>
+          </a:lnRef>
+          <a:fillRef idx="0">
+            <a:schemeClr val="dk1"/>
+          </a:fillRef>
+          <a:effectRef idx="1">
+            <a:schemeClr val="dk1"/>
+          </a:effectRef>
+          <a:fontRef idx="minor">
+            <a:schemeClr val="tx1"/>
+          </a:fontRef>
+        </p:style>
+      </p:cxnSp>
+      <p:cxnSp>
+        <p:nvCxnSpPr>
+          <p:cNvPr id="16" name="Straight Arrow Connector 15">
+            <a:extLst>
+              <a:ext uri="{FF2B5EF4-FFF2-40B4-BE49-F238E27FC236}">
+                <a16:creationId xmlns:a16="http://schemas.microsoft.com/office/drawing/2014/main" id="{68DC09E8-45B1-7C9B-F2FE-B04A6DDBFB15}"/>
+              </a:ext>
+            </a:extLst>
+          </p:cNvPr>
+          <p:cNvCxnSpPr>
+            <a:cxnSpLocks/>
+          </p:cNvCxnSpPr>
+          <p:nvPr/>
+        </p:nvCxnSpPr>
+        <p:spPr>
+          <a:xfrm flipV="1">
+            <a:off x="1828800" y="899862"/>
+            <a:ext cx="0" cy="5021967"/>
+          </a:xfrm>
+          <a:prstGeom prst="straightConnector1">
+            <a:avLst/>
+          </a:prstGeom>
+          <a:ln w="76200">
+            <a:headEnd type="triangle"/>
+            <a:tailEnd type="triangle"/>
+          </a:ln>
+        </p:spPr>
+        <p:style>
+          <a:lnRef idx="2">
+            <a:schemeClr val="dk1"/>
+          </a:lnRef>
+          <a:fillRef idx="0">
+            <a:schemeClr val="dk1"/>
+          </a:fillRef>
+          <a:effectRef idx="1">
+            <a:schemeClr val="dk1"/>
+          </a:effectRef>
+          <a:fontRef idx="minor">
+            <a:schemeClr val="tx1"/>
+          </a:fontRef>
+        </p:style>
+      </p:cxnSp>
+      <p:cxnSp>
+        <p:nvCxnSpPr>
+          <p:cNvPr id="20" name="Straight Arrow Connector 19">
+            <a:extLst>
+              <a:ext uri="{FF2B5EF4-FFF2-40B4-BE49-F238E27FC236}">
+                <a16:creationId xmlns:a16="http://schemas.microsoft.com/office/drawing/2014/main" id="{BE913E66-5066-F748-8650-A521C9410F16}"/>
+              </a:ext>
+            </a:extLst>
+          </p:cNvPr>
+          <p:cNvCxnSpPr>
+            <a:cxnSpLocks/>
+          </p:cNvCxnSpPr>
+          <p:nvPr/>
+        </p:nvCxnSpPr>
+        <p:spPr>
+          <a:xfrm>
+            <a:off x="7881257" y="899862"/>
+            <a:ext cx="0" cy="5021967"/>
+          </a:xfrm>
+          <a:prstGeom prst="straightConnector1">
+            <a:avLst/>
+          </a:prstGeom>
+          <a:ln w="76200">
+            <a:headEnd type="triangle"/>
+            <a:tailEnd type="triangle"/>
+          </a:ln>
+        </p:spPr>
+        <p:style>
+          <a:lnRef idx="2">
+            <a:schemeClr val="dk1"/>
+          </a:lnRef>
+          <a:fillRef idx="0">
+            <a:schemeClr val="dk1"/>
+          </a:fillRef>
+          <a:effectRef idx="1">
+            <a:schemeClr val="dk1"/>
+          </a:effectRef>
+          <a:fontRef idx="minor">
+            <a:schemeClr val="tx1"/>
+          </a:fontRef>
+        </p:style>
+      </p:cxnSp>
+      <p:cxnSp>
+        <p:nvCxnSpPr>
+          <p:cNvPr id="23" name="Straight Arrow Connector 22">
+            <a:extLst>
+              <a:ext uri="{FF2B5EF4-FFF2-40B4-BE49-F238E27FC236}">
+                <a16:creationId xmlns:a16="http://schemas.microsoft.com/office/drawing/2014/main" id="{C390351C-7EAA-1407-ECC9-CE182E08F5FB}"/>
+              </a:ext>
+            </a:extLst>
+          </p:cNvPr>
+          <p:cNvCxnSpPr>
+            <a:cxnSpLocks/>
+          </p:cNvCxnSpPr>
+          <p:nvPr/>
+        </p:nvCxnSpPr>
+        <p:spPr>
+          <a:xfrm>
+            <a:off x="2438401" y="1008719"/>
+            <a:ext cx="4876799" cy="4913110"/>
+          </a:xfrm>
+          <a:prstGeom prst="straightConnector1">
+            <a:avLst/>
+          </a:prstGeom>
+          <a:ln w="76200">
+            <a:headEnd type="triangle"/>
+            <a:tailEnd type="triangle"/>
+          </a:ln>
+        </p:spPr>
+        <p:style>
+          <a:lnRef idx="2">
+            <a:schemeClr val="dk1"/>
+          </a:lnRef>
+          <a:fillRef idx="0">
+            <a:schemeClr val="dk1"/>
+          </a:fillRef>
+          <a:effectRef idx="1">
+            <a:schemeClr val="dk1"/>
+          </a:effectRef>
+          <a:fontRef idx="minor">
+            <a:schemeClr val="tx1"/>
+          </a:fontRef>
+        </p:style>
+      </p:cxnSp>
+      <p:cxnSp>
+        <p:nvCxnSpPr>
+          <p:cNvPr id="26" name="Straight Arrow Connector 25">
+            <a:extLst>
+              <a:ext uri="{FF2B5EF4-FFF2-40B4-BE49-F238E27FC236}">
+                <a16:creationId xmlns:a16="http://schemas.microsoft.com/office/drawing/2014/main" id="{31C2C253-EBE9-EB12-F94A-1B7F2CA850D4}"/>
+              </a:ext>
+            </a:extLst>
+          </p:cNvPr>
+          <p:cNvCxnSpPr>
+            <a:cxnSpLocks/>
+          </p:cNvCxnSpPr>
+          <p:nvPr/>
+        </p:nvCxnSpPr>
+        <p:spPr>
+          <a:xfrm flipV="1">
+            <a:off x="2351313" y="936171"/>
+            <a:ext cx="4539344" cy="4985658"/>
+          </a:xfrm>
+          <a:prstGeom prst="straightConnector1">
+            <a:avLst/>
+          </a:prstGeom>
+          <a:ln w="76200">
+            <a:headEnd type="triangle"/>
+            <a:tailEnd type="triangle"/>
+          </a:ln>
+        </p:spPr>
+        <p:style>
+          <a:lnRef idx="2">
+            <a:schemeClr val="dk1"/>
+          </a:lnRef>
+          <a:fillRef idx="0">
+            <a:schemeClr val="dk1"/>
+          </a:fillRef>
+          <a:effectRef idx="1">
+            <a:schemeClr val="dk1"/>
+          </a:effectRef>
+          <a:fontRef idx="minor">
+            <a:schemeClr val="tx1"/>
+          </a:fontRef>
+        </p:style>
+      </p:cxnSp>
+      <p:sp>
+        <p:nvSpPr>
+          <p:cNvPr id="3" name="TextBox 2">
+            <a:extLst>
+              <a:ext uri="{FF2B5EF4-FFF2-40B4-BE49-F238E27FC236}">
+                <a16:creationId xmlns:a16="http://schemas.microsoft.com/office/drawing/2014/main" id="{2DB93F6E-84BE-2CB8-C6F3-45F50C90FF84}"/>
+              </a:ext>
+            </a:extLst>
+          </p:cNvPr>
+          <p:cNvSpPr txBox="1"/>
+          <p:nvPr/>
+        </p:nvSpPr>
+        <p:spPr>
+          <a:xfrm>
+            <a:off x="185058" y="257226"/>
+            <a:ext cx="4093029" cy="769441"/>
+          </a:xfrm>
+          <a:prstGeom prst="rect">
+            <a:avLst/>
+          </a:prstGeom>
+          <a:noFill/>
+        </p:spPr>
+        <p:txBody>
+          <a:bodyPr wrap="square" rtlCol="0">
+            <a:spAutoFit/>
+          </a:bodyPr>
+          <a:lstStyle/>
+          <a:p>
+            <a:r>
+              <a:rPr lang="en-US" sz="4400" b="1" dirty="0"/>
+              <a:t>CONTEXT</a:t>
+            </a:r>
+          </a:p>
+        </p:txBody>
+      </p:sp>
+    </p:spTree>
+    <p:extLst>
+      <p:ext uri="{BB962C8B-B14F-4D97-AF65-F5344CB8AC3E}">
+        <p14:creationId xmlns:p14="http://schemas.microsoft.com/office/powerpoint/2010/main" val="2748737718"/>
+      </p:ext>
+    </p:extLst>
+  </p:cSld>
+  <p:clrMapOvr>
+    <a:masterClrMapping/>
+  </p:clrMapOvr>
+</p:sld>
+</file>
+
+<file path=ppt/slides/slide3.xml><?xml version="1.0" encoding="utf-8"?>
+<p:sld xmlns:a="http://schemas.openxmlformats.org/drawingml/2006/main" xmlns:r="http://schemas.openxmlformats.org/officeDocument/2006/relationships" xmlns:p="http://schemas.openxmlformats.org/presentationml/2006/main">
+  <p:cSld>
+    <p:spTree>
+      <p:nvGrpSpPr>
+        <p:cNvPr id="1" name="">
+          <a:extLst>
+            <a:ext uri="{FF2B5EF4-FFF2-40B4-BE49-F238E27FC236}">
+              <a16:creationId xmlns:a16="http://schemas.microsoft.com/office/drawing/2014/main" id="{466952B4-00E9-03B4-953E-0D4A5D5168CC}"/>
+            </a:ext>
+          </a:extLst>
+        </p:cNvPr>
+        <p:cNvGrpSpPr/>
+        <p:nvPr/>
+      </p:nvGrpSpPr>
+      <p:grpSpPr>
+        <a:xfrm>
+          <a:off x="0" y="0"/>
+          <a:ext cx="0" cy="0"/>
+          <a:chOff x="0" y="0"/>
+          <a:chExt cx="0" cy="0"/>
+        </a:xfrm>
+      </p:grpSpPr>
+      <p:sp>
+        <p:nvSpPr>
+          <p:cNvPr id="4" name="TextBox 3">
+            <a:extLst>
+              <a:ext uri="{FF2B5EF4-FFF2-40B4-BE49-F238E27FC236}">
+                <a16:creationId xmlns:a16="http://schemas.microsoft.com/office/drawing/2014/main" id="{7DCC081D-F620-DF46-A209-E97AEBFDBA59}"/>
+              </a:ext>
+            </a:extLst>
+          </p:cNvPr>
+          <p:cNvSpPr txBox="1"/>
+          <p:nvPr/>
+        </p:nvSpPr>
+        <p:spPr>
+          <a:xfrm>
+            <a:off x="185058" y="257226"/>
+            <a:ext cx="4093029" cy="769441"/>
+          </a:xfrm>
+          <a:prstGeom prst="rect">
+            <a:avLst/>
+          </a:prstGeom>
+          <a:noFill/>
+        </p:spPr>
+        <p:txBody>
+          <a:bodyPr wrap="square" rtlCol="0">
+            <a:spAutoFit/>
+          </a:bodyPr>
+          <a:lstStyle/>
+          <a:p>
+            <a:r>
+              <a:rPr lang="en-US" sz="4400" b="1" dirty="0"/>
+              <a:t>CONTEXT</a:t>
+            </a:r>
+          </a:p>
+        </p:txBody>
+      </p:sp>
+      <p:sp>
+        <p:nvSpPr>
+          <p:cNvPr id="5" name="TextBox 4">
+            <a:extLst>
+              <a:ext uri="{FF2B5EF4-FFF2-40B4-BE49-F238E27FC236}">
+                <a16:creationId xmlns:a16="http://schemas.microsoft.com/office/drawing/2014/main" id="{5B2E33E1-2B92-C00F-7BF1-11C3B62D91ED}"/>
+              </a:ext>
+            </a:extLst>
+          </p:cNvPr>
+          <p:cNvSpPr txBox="1"/>
+          <p:nvPr/>
+        </p:nvSpPr>
+        <p:spPr>
+          <a:xfrm>
+            <a:off x="87085" y="5802086"/>
+            <a:ext cx="4093029" cy="769441"/>
+          </a:xfrm>
+          <a:prstGeom prst="rect">
+            <a:avLst/>
+          </a:prstGeom>
+          <a:noFill/>
+        </p:spPr>
+        <p:txBody>
+          <a:bodyPr wrap="square" rtlCol="0">
+            <a:spAutoFit/>
+          </a:bodyPr>
+          <a:lstStyle/>
+          <a:p>
+            <a:r>
+              <a:rPr lang="en-US" sz="4400" b="1" dirty="0"/>
+              <a:t>MIGRATION</a:t>
+            </a:r>
+          </a:p>
+        </p:txBody>
+      </p:sp>
+      <p:sp>
+        <p:nvSpPr>
+          <p:cNvPr id="6" name="TextBox 5">
+            <a:extLst>
+              <a:ext uri="{FF2B5EF4-FFF2-40B4-BE49-F238E27FC236}">
+                <a16:creationId xmlns:a16="http://schemas.microsoft.com/office/drawing/2014/main" id="{B6283089-A856-026F-4EBB-64F41FDE2871}"/>
+              </a:ext>
+            </a:extLst>
+          </p:cNvPr>
+          <p:cNvSpPr txBox="1"/>
+          <p:nvPr/>
+        </p:nvSpPr>
+        <p:spPr>
+          <a:xfrm>
+            <a:off x="5464629" y="5802087"/>
+            <a:ext cx="4093029" cy="769441"/>
+          </a:xfrm>
+          <a:prstGeom prst="rect">
+            <a:avLst/>
+          </a:prstGeom>
+          <a:noFill/>
+        </p:spPr>
+        <p:txBody>
+          <a:bodyPr wrap="square" rtlCol="0">
+            <a:spAutoFit/>
+          </a:bodyPr>
+          <a:lstStyle/>
+          <a:p>
+            <a:r>
+              <a:rPr lang="en-US" sz="4400" b="1" dirty="0"/>
+              <a:t>URBANICITY</a:t>
+            </a:r>
+          </a:p>
+        </p:txBody>
+      </p:sp>
+      <p:sp>
+        <p:nvSpPr>
+          <p:cNvPr id="7" name="TextBox 6">
+            <a:extLst>
+              <a:ext uri="{FF2B5EF4-FFF2-40B4-BE49-F238E27FC236}">
+                <a16:creationId xmlns:a16="http://schemas.microsoft.com/office/drawing/2014/main" id="{8AE2918A-E672-1A5D-8E50-2D986C939272}"/>
+              </a:ext>
+            </a:extLst>
+          </p:cNvPr>
+          <p:cNvSpPr txBox="1"/>
+          <p:nvPr/>
+        </p:nvSpPr>
+        <p:spPr>
+          <a:xfrm>
+            <a:off x="5050971" y="286473"/>
+            <a:ext cx="4093029" cy="769441"/>
+          </a:xfrm>
+          <a:prstGeom prst="rect">
+            <a:avLst/>
+          </a:prstGeom>
+          <a:noFill/>
+        </p:spPr>
+        <p:txBody>
+          <a:bodyPr wrap="square" rtlCol="0">
+            <a:spAutoFit/>
+          </a:bodyPr>
+          <a:lstStyle/>
+          <a:p>
+            <a:r>
+              <a:rPr lang="en-US" sz="4400" b="1" dirty="0"/>
+              <a:t>COMPOSITION</a:t>
+            </a:r>
+          </a:p>
+        </p:txBody>
+      </p:sp>
+      <p:cxnSp>
+        <p:nvCxnSpPr>
+          <p:cNvPr id="9" name="Straight Arrow Connector 8">
+            <a:extLst>
+              <a:ext uri="{FF2B5EF4-FFF2-40B4-BE49-F238E27FC236}">
+                <a16:creationId xmlns:a16="http://schemas.microsoft.com/office/drawing/2014/main" id="{A79462B2-02FD-A465-5346-3E78A9C354DF}"/>
+              </a:ext>
+            </a:extLst>
+          </p:cNvPr>
+          <p:cNvCxnSpPr>
+            <a:cxnSpLocks/>
+            <a:endCxn id="7" idx="1"/>
+          </p:cNvCxnSpPr>
+          <p:nvPr/>
+        </p:nvCxnSpPr>
+        <p:spPr>
+          <a:xfrm>
+            <a:off x="2852057" y="671193"/>
+            <a:ext cx="2198914" cy="1"/>
+          </a:xfrm>
+          <a:prstGeom prst="straightConnector1">
+            <a:avLst/>
+          </a:prstGeom>
+          <a:ln w="76200">
+            <a:headEnd type="triangle"/>
+            <a:tailEnd type="triangle"/>
+          </a:ln>
+        </p:spPr>
+        <p:style>
+          <a:lnRef idx="2">
+            <a:schemeClr val="dk1"/>
+          </a:lnRef>
+          <a:fillRef idx="0">
+            <a:schemeClr val="dk1"/>
+          </a:fillRef>
+          <a:effectRef idx="1">
+            <a:schemeClr val="dk1"/>
+          </a:effectRef>
+          <a:fontRef idx="minor">
+            <a:schemeClr val="tx1"/>
+          </a:fontRef>
+        </p:style>
+      </p:cxnSp>
+      <p:cxnSp>
+        <p:nvCxnSpPr>
+          <p:cNvPr id="15" name="Straight Arrow Connector 14">
+            <a:extLst>
+              <a:ext uri="{FF2B5EF4-FFF2-40B4-BE49-F238E27FC236}">
+                <a16:creationId xmlns:a16="http://schemas.microsoft.com/office/drawing/2014/main" id="{161025B3-27B6-30C4-B885-A5DAAE1FE58B}"/>
+              </a:ext>
+            </a:extLst>
+          </p:cNvPr>
+          <p:cNvCxnSpPr>
+            <a:cxnSpLocks/>
+          </p:cNvCxnSpPr>
+          <p:nvPr/>
+        </p:nvCxnSpPr>
+        <p:spPr>
+          <a:xfrm>
+            <a:off x="3254829" y="6186806"/>
+            <a:ext cx="2198914" cy="1"/>
+          </a:xfrm>
+          <a:prstGeom prst="straightConnector1">
+            <a:avLst/>
+          </a:prstGeom>
+          <a:ln w="76200">
+            <a:headEnd type="triangle"/>
+            <a:tailEnd type="triangle"/>
+          </a:ln>
+        </p:spPr>
+        <p:style>
+          <a:lnRef idx="2">
+            <a:schemeClr val="dk1"/>
+          </a:lnRef>
+          <a:fillRef idx="0">
+            <a:schemeClr val="dk1"/>
+          </a:fillRef>
+          <a:effectRef idx="1">
+            <a:schemeClr val="dk1"/>
+          </a:effectRef>
+          <a:fontRef idx="minor">
+            <a:schemeClr val="tx1"/>
+          </a:fontRef>
+        </p:style>
+      </p:cxnSp>
+      <p:cxnSp>
+        <p:nvCxnSpPr>
+          <p:cNvPr id="16" name="Straight Arrow Connector 15">
+            <a:extLst>
+              <a:ext uri="{FF2B5EF4-FFF2-40B4-BE49-F238E27FC236}">
+                <a16:creationId xmlns:a16="http://schemas.microsoft.com/office/drawing/2014/main" id="{FC3DB9E1-BA53-C341-4739-35EA9D21B4A7}"/>
+              </a:ext>
+            </a:extLst>
+          </p:cNvPr>
+          <p:cNvCxnSpPr>
+            <a:cxnSpLocks/>
+          </p:cNvCxnSpPr>
+          <p:nvPr/>
+        </p:nvCxnSpPr>
+        <p:spPr>
+          <a:xfrm flipV="1">
+            <a:off x="1828800" y="899862"/>
+            <a:ext cx="0" cy="5021967"/>
+          </a:xfrm>
+          <a:prstGeom prst="straightConnector1">
+            <a:avLst/>
+          </a:prstGeom>
+          <a:ln w="76200">
+            <a:headEnd type="triangle"/>
+            <a:tailEnd type="triangle"/>
+          </a:ln>
+        </p:spPr>
+        <p:style>
+          <a:lnRef idx="2">
+            <a:schemeClr val="dk1"/>
+          </a:lnRef>
+          <a:fillRef idx="0">
+            <a:schemeClr val="dk1"/>
+          </a:fillRef>
+          <a:effectRef idx="1">
+            <a:schemeClr val="dk1"/>
+          </a:effectRef>
+          <a:fontRef idx="minor">
+            <a:schemeClr val="tx1"/>
+          </a:fontRef>
+        </p:style>
+      </p:cxnSp>
+      <p:cxnSp>
+        <p:nvCxnSpPr>
+          <p:cNvPr id="20" name="Straight Arrow Connector 19">
+            <a:extLst>
+              <a:ext uri="{FF2B5EF4-FFF2-40B4-BE49-F238E27FC236}">
+                <a16:creationId xmlns:a16="http://schemas.microsoft.com/office/drawing/2014/main" id="{4F66CE7E-E81C-6A5F-211A-21F56ACF9B28}"/>
+              </a:ext>
+            </a:extLst>
+          </p:cNvPr>
+          <p:cNvCxnSpPr>
+            <a:cxnSpLocks/>
+          </p:cNvCxnSpPr>
+          <p:nvPr/>
+        </p:nvCxnSpPr>
+        <p:spPr>
+          <a:xfrm>
+            <a:off x="7881257" y="899862"/>
+            <a:ext cx="0" cy="5021967"/>
+          </a:xfrm>
+          <a:prstGeom prst="straightConnector1">
+            <a:avLst/>
+          </a:prstGeom>
+          <a:ln w="76200">
+            <a:headEnd type="triangle"/>
+            <a:tailEnd type="triangle"/>
+          </a:ln>
+        </p:spPr>
+        <p:style>
+          <a:lnRef idx="2">
+            <a:schemeClr val="dk1"/>
+          </a:lnRef>
+          <a:fillRef idx="0">
+            <a:schemeClr val="dk1"/>
+          </a:fillRef>
+          <a:effectRef idx="1">
+            <a:schemeClr val="dk1"/>
+          </a:effectRef>
+          <a:fontRef idx="minor">
+            <a:schemeClr val="tx1"/>
+          </a:fontRef>
+        </p:style>
+      </p:cxnSp>
+      <p:cxnSp>
+        <p:nvCxnSpPr>
+          <p:cNvPr id="23" name="Straight Arrow Connector 22">
+            <a:extLst>
+              <a:ext uri="{FF2B5EF4-FFF2-40B4-BE49-F238E27FC236}">
+                <a16:creationId xmlns:a16="http://schemas.microsoft.com/office/drawing/2014/main" id="{4E5164D3-52C6-BD52-6D29-C03BEDEBE506}"/>
+              </a:ext>
+            </a:extLst>
+          </p:cNvPr>
+          <p:cNvCxnSpPr>
+            <a:cxnSpLocks/>
+          </p:cNvCxnSpPr>
+          <p:nvPr/>
+        </p:nvCxnSpPr>
+        <p:spPr>
+          <a:xfrm>
+            <a:off x="2438401" y="1008719"/>
+            <a:ext cx="4876799" cy="4913110"/>
+          </a:xfrm>
+          <a:prstGeom prst="straightConnector1">
+            <a:avLst/>
+          </a:prstGeom>
+          <a:ln w="76200">
+            <a:headEnd type="triangle"/>
+            <a:tailEnd type="triangle"/>
+          </a:ln>
+        </p:spPr>
+        <p:style>
+          <a:lnRef idx="2">
+            <a:schemeClr val="dk1"/>
+          </a:lnRef>
+          <a:fillRef idx="0">
+            <a:schemeClr val="dk1"/>
+          </a:fillRef>
+          <a:effectRef idx="1">
+            <a:schemeClr val="dk1"/>
+          </a:effectRef>
+          <a:fontRef idx="minor">
+            <a:schemeClr val="tx1"/>
+          </a:fontRef>
+        </p:style>
+      </p:cxnSp>
+      <p:cxnSp>
+        <p:nvCxnSpPr>
+          <p:cNvPr id="26" name="Straight Arrow Connector 25">
+            <a:extLst>
+              <a:ext uri="{FF2B5EF4-FFF2-40B4-BE49-F238E27FC236}">
+                <a16:creationId xmlns:a16="http://schemas.microsoft.com/office/drawing/2014/main" id="{D8FDF83F-F2BB-1087-A847-8FFE7B4F9958}"/>
+              </a:ext>
+            </a:extLst>
+          </p:cNvPr>
+          <p:cNvCxnSpPr>
+            <a:cxnSpLocks/>
+          </p:cNvCxnSpPr>
+          <p:nvPr/>
+        </p:nvCxnSpPr>
+        <p:spPr>
+          <a:xfrm flipV="1">
+            <a:off x="2351313" y="936171"/>
+            <a:ext cx="4539344" cy="4985658"/>
+          </a:xfrm>
+          <a:prstGeom prst="straightConnector1">
+            <a:avLst/>
+          </a:prstGeom>
+          <a:ln w="76200">
+            <a:headEnd type="triangle"/>
+            <a:tailEnd type="triangle"/>
+          </a:ln>
+        </p:spPr>
+        <p:style>
+          <a:lnRef idx="2">
+            <a:schemeClr val="dk1"/>
+          </a:lnRef>
+          <a:fillRef idx="0">
+            <a:schemeClr val="dk1"/>
+          </a:fillRef>
+          <a:effectRef idx="1">
+            <a:schemeClr val="dk1"/>
+          </a:effectRef>
+          <a:fontRef idx="minor">
+            <a:schemeClr val="tx1"/>
+          </a:fontRef>
+        </p:style>
+      </p:cxnSp>
+      <p:sp>
+        <p:nvSpPr>
+          <p:cNvPr id="2" name="TextBox 1">
+            <a:extLst>
+              <a:ext uri="{FF2B5EF4-FFF2-40B4-BE49-F238E27FC236}">
+                <a16:creationId xmlns:a16="http://schemas.microsoft.com/office/drawing/2014/main" id="{B26C644B-E275-8A97-A38E-34797E07EC2E}"/>
+              </a:ext>
+            </a:extLst>
+          </p:cNvPr>
+          <p:cNvSpPr txBox="1"/>
+          <p:nvPr/>
+        </p:nvSpPr>
+        <p:spPr>
+          <a:xfrm>
+            <a:off x="3015343" y="2952711"/>
+            <a:ext cx="3189514" cy="646331"/>
+          </a:xfrm>
+          <a:prstGeom prst="rect">
+            <a:avLst/>
+          </a:prstGeom>
+          <a:solidFill>
+            <a:schemeClr val="bg1">
+              <a:lumMod val="95000"/>
+              <a:alpha val="86000"/>
+            </a:schemeClr>
+          </a:solidFill>
+        </p:spPr>
+        <p:txBody>
+          <a:bodyPr wrap="square" rtlCol="0">
+            <a:spAutoFit/>
+          </a:bodyPr>
+          <a:lstStyle/>
+          <a:p>
+            <a:pPr algn="ctr"/>
+            <a:r>
+              <a:rPr lang="en-US" sz="3600" b="1" dirty="0">
+                <a:solidFill>
+                  <a:srgbClr val="000000"/>
+                </a:solidFill>
+                <a:effectLst>
+                  <a:outerShdw blurRad="38100" dist="38100" dir="2700000" algn="tl">
+                    <a:srgbClr val="000000">
+                      <a:alpha val="43137"/>
+                    </a:srgbClr>
+                  </a:outerShdw>
+                </a:effectLst>
+              </a:rPr>
+              <a:t>MADISON, WI</a:t>
+            </a:r>
+          </a:p>
+        </p:txBody>
+      </p:sp>
+    </p:spTree>
+    <p:extLst>
+      <p:ext uri="{BB962C8B-B14F-4D97-AF65-F5344CB8AC3E}">
+        <p14:creationId xmlns:p14="http://schemas.microsoft.com/office/powerpoint/2010/main" val="1772104576"/>
+      </p:ext>
+    </p:extLst>
+  </p:cSld>
+  <p:clrMapOvr>
+    <a:masterClrMapping/>
+  </p:clrMapOvr>
+</p:sld>
+</file>
+
+<file path=ppt/slides/slide4.xml><?xml version="1.0" encoding="utf-8"?>
+<p:sld xmlns:a="http://schemas.openxmlformats.org/drawingml/2006/main" xmlns:r="http://schemas.openxmlformats.org/officeDocument/2006/relationships" xmlns:p="http://schemas.openxmlformats.org/presentationml/2006/main">
+  <p:cSld>
+    <p:spTree>
+      <p:nvGrpSpPr>
+        <p:cNvPr id="1" name="">
+          <a:extLst>
+            <a:ext uri="{FF2B5EF4-FFF2-40B4-BE49-F238E27FC236}">
+              <a16:creationId xmlns:a16="http://schemas.microsoft.com/office/drawing/2014/main" id="{8C4C99F1-03AA-0649-4C58-ABCA4D121D71}"/>
+            </a:ext>
+          </a:extLst>
+        </p:cNvPr>
+        <p:cNvGrpSpPr/>
+        <p:nvPr/>
+      </p:nvGrpSpPr>
+      <p:grpSpPr>
+        <a:xfrm>
+          <a:off x="0" y="0"/>
+          <a:ext cx="0" cy="0"/>
+          <a:chOff x="0" y="0"/>
+          <a:chExt cx="0" cy="0"/>
+        </a:xfrm>
+      </p:grpSpPr>
+      <p:sp>
+        <p:nvSpPr>
+          <p:cNvPr id="4" name="TextBox 3">
+            <a:extLst>
+              <a:ext uri="{FF2B5EF4-FFF2-40B4-BE49-F238E27FC236}">
+                <a16:creationId xmlns:a16="http://schemas.microsoft.com/office/drawing/2014/main" id="{E8A39E57-DE28-97F6-3297-20926451ADDC}"/>
+              </a:ext>
+            </a:extLst>
+          </p:cNvPr>
+          <p:cNvSpPr txBox="1"/>
+          <p:nvPr/>
+        </p:nvSpPr>
+        <p:spPr>
+          <a:xfrm>
+            <a:off x="185058" y="257226"/>
+            <a:ext cx="4093029" cy="769441"/>
+          </a:xfrm>
+          <a:prstGeom prst="rect">
+            <a:avLst/>
+          </a:prstGeom>
+          <a:noFill/>
+        </p:spPr>
+        <p:txBody>
+          <a:bodyPr wrap="square" rtlCol="0">
+            <a:spAutoFit/>
+          </a:bodyPr>
+          <a:lstStyle/>
+          <a:p>
+            <a:r>
+              <a:rPr lang="en-US" sz="4400" b="1" dirty="0"/>
+              <a:t>CONTEXT</a:t>
+            </a:r>
+          </a:p>
+        </p:txBody>
+      </p:sp>
+      <p:sp>
+        <p:nvSpPr>
+          <p:cNvPr id="5" name="TextBox 4">
+            <a:extLst>
+              <a:ext uri="{FF2B5EF4-FFF2-40B4-BE49-F238E27FC236}">
+                <a16:creationId xmlns:a16="http://schemas.microsoft.com/office/drawing/2014/main" id="{A706A1FE-0272-3592-FF82-5A870F9363A6}"/>
+              </a:ext>
+            </a:extLst>
+          </p:cNvPr>
+          <p:cNvSpPr txBox="1"/>
+          <p:nvPr/>
+        </p:nvSpPr>
+        <p:spPr>
+          <a:xfrm>
+            <a:off x="87085" y="5802086"/>
+            <a:ext cx="4093029" cy="769441"/>
+          </a:xfrm>
+          <a:prstGeom prst="rect">
+            <a:avLst/>
+          </a:prstGeom>
+          <a:noFill/>
+        </p:spPr>
+        <p:txBody>
+          <a:bodyPr wrap="square" rtlCol="0">
+            <a:spAutoFit/>
+          </a:bodyPr>
+          <a:lstStyle/>
+          <a:p>
+            <a:r>
+              <a:rPr lang="en-US" sz="4400" b="1" dirty="0"/>
+              <a:t>MIGRATION</a:t>
+            </a:r>
+          </a:p>
+        </p:txBody>
+      </p:sp>
+      <p:sp>
+        <p:nvSpPr>
+          <p:cNvPr id="6" name="TextBox 5">
+            <a:extLst>
+              <a:ext uri="{FF2B5EF4-FFF2-40B4-BE49-F238E27FC236}">
+                <a16:creationId xmlns:a16="http://schemas.microsoft.com/office/drawing/2014/main" id="{55BFE40D-1EB9-1640-4FFC-21524F272429}"/>
+              </a:ext>
+            </a:extLst>
+          </p:cNvPr>
+          <p:cNvSpPr txBox="1"/>
+          <p:nvPr/>
+        </p:nvSpPr>
+        <p:spPr>
+          <a:xfrm>
+            <a:off x="5464629" y="5802087"/>
+            <a:ext cx="4093029" cy="769441"/>
+          </a:xfrm>
+          <a:prstGeom prst="rect">
+            <a:avLst/>
+          </a:prstGeom>
+          <a:noFill/>
+        </p:spPr>
+        <p:txBody>
+          <a:bodyPr wrap="square" rtlCol="0">
+            <a:spAutoFit/>
+          </a:bodyPr>
+          <a:lstStyle/>
+          <a:p>
+            <a:r>
+              <a:rPr lang="en-US" sz="4400" b="1" dirty="0"/>
+              <a:t>URBANICITY</a:t>
+            </a:r>
+          </a:p>
+        </p:txBody>
+      </p:sp>
+      <p:sp>
+        <p:nvSpPr>
+          <p:cNvPr id="7" name="TextBox 6">
+            <a:extLst>
+              <a:ext uri="{FF2B5EF4-FFF2-40B4-BE49-F238E27FC236}">
+                <a16:creationId xmlns:a16="http://schemas.microsoft.com/office/drawing/2014/main" id="{01882D84-515F-A1BF-19CF-57BE2148067F}"/>
+              </a:ext>
+            </a:extLst>
+          </p:cNvPr>
+          <p:cNvSpPr txBox="1"/>
+          <p:nvPr/>
+        </p:nvSpPr>
+        <p:spPr>
+          <a:xfrm>
+            <a:off x="5050971" y="286473"/>
+            <a:ext cx="4093029" cy="769441"/>
+          </a:xfrm>
+          <a:prstGeom prst="rect">
+            <a:avLst/>
+          </a:prstGeom>
+          <a:noFill/>
+        </p:spPr>
+        <p:txBody>
+          <a:bodyPr wrap="square" rtlCol="0">
+            <a:spAutoFit/>
+          </a:bodyPr>
+          <a:lstStyle/>
+          <a:p>
+            <a:r>
+              <a:rPr lang="en-US" sz="4400" b="1" dirty="0"/>
+              <a:t>COMPOSITION</a:t>
+            </a:r>
+          </a:p>
+        </p:txBody>
+      </p:sp>
+      <p:cxnSp>
+        <p:nvCxnSpPr>
+          <p:cNvPr id="9" name="Straight Arrow Connector 8">
+            <a:extLst>
+              <a:ext uri="{FF2B5EF4-FFF2-40B4-BE49-F238E27FC236}">
+                <a16:creationId xmlns:a16="http://schemas.microsoft.com/office/drawing/2014/main" id="{320E16D6-AA3B-FA31-E387-3CED0118D796}"/>
+              </a:ext>
+            </a:extLst>
+          </p:cNvPr>
+          <p:cNvCxnSpPr>
+            <a:cxnSpLocks/>
+            <a:endCxn id="7" idx="1"/>
+          </p:cNvCxnSpPr>
+          <p:nvPr/>
+        </p:nvCxnSpPr>
+        <p:spPr>
+          <a:xfrm>
+            <a:off x="2852057" y="671193"/>
+            <a:ext cx="2198914" cy="1"/>
+          </a:xfrm>
+          <a:prstGeom prst="straightConnector1">
+            <a:avLst/>
+          </a:prstGeom>
+          <a:ln w="76200">
+            <a:headEnd type="triangle"/>
+            <a:tailEnd type="triangle"/>
+          </a:ln>
+        </p:spPr>
+        <p:style>
+          <a:lnRef idx="2">
+            <a:schemeClr val="dk1"/>
+          </a:lnRef>
+          <a:fillRef idx="0">
+            <a:schemeClr val="dk1"/>
+          </a:fillRef>
+          <a:effectRef idx="1">
+            <a:schemeClr val="dk1"/>
+          </a:effectRef>
+          <a:fontRef idx="minor">
+            <a:schemeClr val="tx1"/>
+          </a:fontRef>
+        </p:style>
+      </p:cxnSp>
+      <p:cxnSp>
+        <p:nvCxnSpPr>
+          <p:cNvPr id="15" name="Straight Arrow Connector 14">
+            <a:extLst>
+              <a:ext uri="{FF2B5EF4-FFF2-40B4-BE49-F238E27FC236}">
+                <a16:creationId xmlns:a16="http://schemas.microsoft.com/office/drawing/2014/main" id="{CF2E7CB8-63C9-C869-F36A-86FB9752A3E3}"/>
+              </a:ext>
+            </a:extLst>
+          </p:cNvPr>
+          <p:cNvCxnSpPr>
+            <a:cxnSpLocks/>
+          </p:cNvCxnSpPr>
+          <p:nvPr/>
+        </p:nvCxnSpPr>
+        <p:spPr>
+          <a:xfrm>
+            <a:off x="3254829" y="6186806"/>
+            <a:ext cx="2198914" cy="1"/>
+          </a:xfrm>
+          <a:prstGeom prst="straightConnector1">
+            <a:avLst/>
+          </a:prstGeom>
+          <a:ln w="76200">
+            <a:headEnd type="triangle"/>
+            <a:tailEnd type="triangle"/>
+          </a:ln>
+        </p:spPr>
+        <p:style>
+          <a:lnRef idx="2">
+            <a:schemeClr val="dk1"/>
+          </a:lnRef>
+          <a:fillRef idx="0">
+            <a:schemeClr val="dk1"/>
+          </a:fillRef>
+          <a:effectRef idx="1">
+            <a:schemeClr val="dk1"/>
+          </a:effectRef>
+          <a:fontRef idx="minor">
+            <a:schemeClr val="tx1"/>
+          </a:fontRef>
+        </p:style>
+      </p:cxnSp>
+      <p:cxnSp>
+        <p:nvCxnSpPr>
+          <p:cNvPr id="16" name="Straight Arrow Connector 15">
+            <a:extLst>
+              <a:ext uri="{FF2B5EF4-FFF2-40B4-BE49-F238E27FC236}">
+                <a16:creationId xmlns:a16="http://schemas.microsoft.com/office/drawing/2014/main" id="{058EB0ED-FC21-E33C-8453-5FFFB68EA630}"/>
+              </a:ext>
+            </a:extLst>
+          </p:cNvPr>
+          <p:cNvCxnSpPr>
+            <a:cxnSpLocks/>
+          </p:cNvCxnSpPr>
+          <p:nvPr/>
+        </p:nvCxnSpPr>
+        <p:spPr>
+          <a:xfrm flipV="1">
+            <a:off x="1828800" y="899862"/>
+            <a:ext cx="0" cy="5021967"/>
+          </a:xfrm>
+          <a:prstGeom prst="straightConnector1">
+            <a:avLst/>
+          </a:prstGeom>
+          <a:ln w="76200">
+            <a:headEnd type="triangle"/>
+            <a:tailEnd type="triangle"/>
+          </a:ln>
+        </p:spPr>
+        <p:style>
+          <a:lnRef idx="2">
+            <a:schemeClr val="dk1"/>
+          </a:lnRef>
+          <a:fillRef idx="0">
+            <a:schemeClr val="dk1"/>
+          </a:fillRef>
+          <a:effectRef idx="1">
+            <a:schemeClr val="dk1"/>
+          </a:effectRef>
+          <a:fontRef idx="minor">
+            <a:schemeClr val="tx1"/>
+          </a:fontRef>
+        </p:style>
+      </p:cxnSp>
+      <p:cxnSp>
+        <p:nvCxnSpPr>
+          <p:cNvPr id="20" name="Straight Arrow Connector 19">
+            <a:extLst>
+              <a:ext uri="{FF2B5EF4-FFF2-40B4-BE49-F238E27FC236}">
+                <a16:creationId xmlns:a16="http://schemas.microsoft.com/office/drawing/2014/main" id="{5DF56A99-057D-EBAA-FAE4-416231E49B11}"/>
+              </a:ext>
+            </a:extLst>
+          </p:cNvPr>
+          <p:cNvCxnSpPr>
+            <a:cxnSpLocks/>
+          </p:cNvCxnSpPr>
+          <p:nvPr/>
+        </p:nvCxnSpPr>
+        <p:spPr>
+          <a:xfrm>
+            <a:off x="7881257" y="899862"/>
+            <a:ext cx="0" cy="5021967"/>
+          </a:xfrm>
+          <a:prstGeom prst="straightConnector1">
+            <a:avLst/>
+          </a:prstGeom>
+          <a:ln w="76200">
+            <a:headEnd type="triangle"/>
+            <a:tailEnd type="triangle"/>
+          </a:ln>
+        </p:spPr>
+        <p:style>
+          <a:lnRef idx="2">
+            <a:schemeClr val="dk1"/>
+          </a:lnRef>
+          <a:fillRef idx="0">
+            <a:schemeClr val="dk1"/>
+          </a:fillRef>
+          <a:effectRef idx="1">
+            <a:schemeClr val="dk1"/>
+          </a:effectRef>
+          <a:fontRef idx="minor">
+            <a:schemeClr val="tx1"/>
+          </a:fontRef>
+        </p:style>
+      </p:cxnSp>
+      <p:cxnSp>
+        <p:nvCxnSpPr>
+          <p:cNvPr id="23" name="Straight Arrow Connector 22">
+            <a:extLst>
+              <a:ext uri="{FF2B5EF4-FFF2-40B4-BE49-F238E27FC236}">
+                <a16:creationId xmlns:a16="http://schemas.microsoft.com/office/drawing/2014/main" id="{906EA9E4-1014-5A61-6FCB-7DBFF5F55210}"/>
+              </a:ext>
+            </a:extLst>
+          </p:cNvPr>
+          <p:cNvCxnSpPr>
+            <a:cxnSpLocks/>
+          </p:cNvCxnSpPr>
+          <p:nvPr/>
+        </p:nvCxnSpPr>
+        <p:spPr>
+          <a:xfrm>
+            <a:off x="2438401" y="1008719"/>
+            <a:ext cx="4876799" cy="4913110"/>
+          </a:xfrm>
+          <a:prstGeom prst="straightConnector1">
+            <a:avLst/>
+          </a:prstGeom>
+          <a:ln w="76200">
+            <a:headEnd type="triangle"/>
+            <a:tailEnd type="triangle"/>
+          </a:ln>
+        </p:spPr>
+        <p:style>
+          <a:lnRef idx="2">
+            <a:schemeClr val="dk1"/>
+          </a:lnRef>
+          <a:fillRef idx="0">
+            <a:schemeClr val="dk1"/>
+          </a:fillRef>
+          <a:effectRef idx="1">
+            <a:schemeClr val="dk1"/>
+          </a:effectRef>
+          <a:fontRef idx="minor">
+            <a:schemeClr val="tx1"/>
+          </a:fontRef>
+        </p:style>
+      </p:cxnSp>
+      <p:cxnSp>
+        <p:nvCxnSpPr>
+          <p:cNvPr id="26" name="Straight Arrow Connector 25">
+            <a:extLst>
+              <a:ext uri="{FF2B5EF4-FFF2-40B4-BE49-F238E27FC236}">
+                <a16:creationId xmlns:a16="http://schemas.microsoft.com/office/drawing/2014/main" id="{D992A8E3-890E-2DD0-A173-601A7807C782}"/>
+              </a:ext>
+            </a:extLst>
+          </p:cNvPr>
+          <p:cNvCxnSpPr>
+            <a:cxnSpLocks/>
+          </p:cNvCxnSpPr>
+          <p:nvPr/>
+        </p:nvCxnSpPr>
+        <p:spPr>
+          <a:xfrm flipV="1">
+            <a:off x="2351313" y="936171"/>
+            <a:ext cx="4539344" cy="4985658"/>
+          </a:xfrm>
+          <a:prstGeom prst="straightConnector1">
+            <a:avLst/>
+          </a:prstGeom>
+          <a:ln w="76200">
+            <a:headEnd type="triangle"/>
+            <a:tailEnd type="triangle"/>
+          </a:ln>
+        </p:spPr>
+        <p:style>
+          <a:lnRef idx="2">
+            <a:schemeClr val="dk1"/>
+          </a:lnRef>
+          <a:fillRef idx="0">
+            <a:schemeClr val="dk1"/>
+          </a:fillRef>
+          <a:effectRef idx="1">
+            <a:schemeClr val="dk1"/>
+          </a:effectRef>
+          <a:fontRef idx="minor">
+            <a:schemeClr val="tx1"/>
+          </a:fontRef>
+        </p:style>
+      </p:cxnSp>
+      <p:sp>
+        <p:nvSpPr>
+          <p:cNvPr id="3" name="TextBox 2">
+            <a:extLst>
+              <a:ext uri="{FF2B5EF4-FFF2-40B4-BE49-F238E27FC236}">
+                <a16:creationId xmlns:a16="http://schemas.microsoft.com/office/drawing/2014/main" id="{2D59A3C5-E713-7A37-4309-5EA5027C12E3}"/>
+              </a:ext>
+            </a:extLst>
+          </p:cNvPr>
+          <p:cNvSpPr txBox="1"/>
+          <p:nvPr/>
+        </p:nvSpPr>
+        <p:spPr>
+          <a:xfrm>
+            <a:off x="185058" y="1050463"/>
+            <a:ext cx="2566679" cy="1200329"/>
+          </a:xfrm>
+          <a:prstGeom prst="rect">
+            <a:avLst/>
+          </a:prstGeom>
+          <a:solidFill>
+            <a:schemeClr val="bg1">
+              <a:lumMod val="95000"/>
+              <a:alpha val="86000"/>
+            </a:schemeClr>
+          </a:solidFill>
+        </p:spPr>
+        <p:txBody>
+          <a:bodyPr wrap="square" rtlCol="0">
+            <a:spAutoFit/>
+          </a:bodyPr>
+          <a:lstStyle/>
+          <a:p>
+            <a:r>
+              <a:rPr lang="en-US" sz="2400" b="1" dirty="0">
+                <a:solidFill>
+                  <a:srgbClr val="9C1212"/>
+                </a:solidFill>
+                <a:effectLst>
+                  <a:outerShdw blurRad="38100" dist="38100" dir="2700000" algn="tl">
+                    <a:srgbClr val="000000">
+                      <a:alpha val="43137"/>
+                    </a:srgbClr>
+                  </a:outerShdw>
+                </a:effectLst>
+              </a:rPr>
+              <a:t>Public university</a:t>
+            </a:r>
+          </a:p>
+          <a:p>
+            <a:r>
+              <a:rPr lang="en-US" sz="2400" b="1" dirty="0">
+                <a:solidFill>
+                  <a:srgbClr val="9C1212"/>
+                </a:solidFill>
+                <a:effectLst>
+                  <a:outerShdw blurRad="38100" dist="38100" dir="2700000" algn="tl">
+                    <a:srgbClr val="000000">
+                      <a:alpha val="43137"/>
+                    </a:srgbClr>
+                  </a:outerShdw>
+                </a:effectLst>
+              </a:rPr>
+              <a:t>Isthmus </a:t>
+            </a:r>
+          </a:p>
+          <a:p>
+            <a:r>
+              <a:rPr lang="en-US" sz="2400" b="1" dirty="0">
+                <a:solidFill>
+                  <a:srgbClr val="9C1212"/>
+                </a:solidFill>
+                <a:effectLst>
+                  <a:outerShdw blurRad="38100" dist="38100" dir="2700000" algn="tl">
+                    <a:srgbClr val="000000">
+                      <a:alpha val="43137"/>
+                    </a:srgbClr>
+                  </a:outerShdw>
+                </a:effectLst>
+              </a:rPr>
+              <a:t>State Capital</a:t>
+            </a:r>
+            <a:endParaRPr lang="en-US" sz="2000" b="1" dirty="0">
+              <a:solidFill>
+                <a:srgbClr val="9C1212"/>
+              </a:solidFill>
+              <a:effectLst>
+                <a:outerShdw blurRad="38100" dist="38100" dir="2700000" algn="tl">
+                  <a:srgbClr val="000000">
+                    <a:alpha val="43137"/>
+                  </a:srgbClr>
+                </a:outerShdw>
+              </a:effectLst>
+            </a:endParaRPr>
+          </a:p>
+        </p:txBody>
+      </p:sp>
+      <p:sp>
+        <p:nvSpPr>
+          <p:cNvPr id="2" name="TextBox 1">
+            <a:extLst>
+              <a:ext uri="{FF2B5EF4-FFF2-40B4-BE49-F238E27FC236}">
+                <a16:creationId xmlns:a16="http://schemas.microsoft.com/office/drawing/2014/main" id="{E8BD05D3-710F-0C4D-641A-A8FECA6563B3}"/>
+              </a:ext>
+            </a:extLst>
+          </p:cNvPr>
+          <p:cNvSpPr txBox="1"/>
+          <p:nvPr/>
+        </p:nvSpPr>
+        <p:spPr>
+          <a:xfrm>
+            <a:off x="3015343" y="2952711"/>
+            <a:ext cx="3189514" cy="646331"/>
+          </a:xfrm>
+          <a:prstGeom prst="rect">
+            <a:avLst/>
+          </a:prstGeom>
+          <a:solidFill>
+            <a:schemeClr val="bg1">
+              <a:lumMod val="95000"/>
+              <a:alpha val="86000"/>
+            </a:schemeClr>
+          </a:solidFill>
+        </p:spPr>
+        <p:txBody>
+          <a:bodyPr wrap="square" rtlCol="0">
+            <a:spAutoFit/>
+          </a:bodyPr>
+          <a:lstStyle/>
+          <a:p>
+            <a:pPr algn="ctr"/>
+            <a:r>
+              <a:rPr lang="en-US" sz="3600" b="1" dirty="0">
+                <a:solidFill>
+                  <a:srgbClr val="000000"/>
+                </a:solidFill>
+                <a:effectLst>
+                  <a:outerShdw blurRad="38100" dist="38100" dir="2700000" algn="tl">
+                    <a:srgbClr val="000000">
+                      <a:alpha val="43137"/>
+                    </a:srgbClr>
+                  </a:outerShdw>
+                </a:effectLst>
+              </a:rPr>
+              <a:t>MADISON, WI</a:t>
+            </a:r>
+          </a:p>
+        </p:txBody>
+      </p:sp>
+    </p:spTree>
+    <p:extLst>
+      <p:ext uri="{BB962C8B-B14F-4D97-AF65-F5344CB8AC3E}">
+        <p14:creationId xmlns:p14="http://schemas.microsoft.com/office/powerpoint/2010/main" val="1174911599"/>
+      </p:ext>
+    </p:extLst>
+  </p:cSld>
+  <p:clrMapOvr>
+    <a:masterClrMapping/>
+  </p:clrMapOvr>
+</p:sld>
+</file>
+
+<file path=ppt/slides/slide5.xml><?xml version="1.0" encoding="utf-8"?>
+<p:sld xmlns:a="http://schemas.openxmlformats.org/drawingml/2006/main" xmlns:r="http://schemas.openxmlformats.org/officeDocument/2006/relationships" xmlns:p="http://schemas.openxmlformats.org/presentationml/2006/main">
+  <p:cSld>
+    <p:spTree>
+      <p:nvGrpSpPr>
+        <p:cNvPr id="1" name="">
+          <a:extLst>
+            <a:ext uri="{FF2B5EF4-FFF2-40B4-BE49-F238E27FC236}">
+              <a16:creationId xmlns:a16="http://schemas.microsoft.com/office/drawing/2014/main" id="{7F3A9D15-AB2E-F19F-9099-544A16584B08}"/>
+            </a:ext>
+          </a:extLst>
+        </p:cNvPr>
+        <p:cNvGrpSpPr/>
+        <p:nvPr/>
+      </p:nvGrpSpPr>
+      <p:grpSpPr>
+        <a:xfrm>
+          <a:off x="0" y="0"/>
+          <a:ext cx="0" cy="0"/>
+          <a:chOff x="0" y="0"/>
+          <a:chExt cx="0" cy="0"/>
+        </a:xfrm>
+      </p:grpSpPr>
+      <p:sp>
+        <p:nvSpPr>
+          <p:cNvPr id="4" name="TextBox 3">
+            <a:extLst>
+              <a:ext uri="{FF2B5EF4-FFF2-40B4-BE49-F238E27FC236}">
+                <a16:creationId xmlns:a16="http://schemas.microsoft.com/office/drawing/2014/main" id="{72ACFF89-DFFB-DEF7-A8CF-EED669D32474}"/>
+              </a:ext>
+            </a:extLst>
+          </p:cNvPr>
+          <p:cNvSpPr txBox="1"/>
+          <p:nvPr/>
+        </p:nvSpPr>
+        <p:spPr>
+          <a:xfrm>
+            <a:off x="185058" y="257226"/>
+            <a:ext cx="4093029" cy="769441"/>
+          </a:xfrm>
+          <a:prstGeom prst="rect">
+            <a:avLst/>
+          </a:prstGeom>
+          <a:noFill/>
+        </p:spPr>
+        <p:txBody>
+          <a:bodyPr wrap="square" rtlCol="0">
+            <a:spAutoFit/>
+          </a:bodyPr>
+          <a:lstStyle/>
+          <a:p>
+            <a:r>
+              <a:rPr lang="en-US" sz="4400" b="1" dirty="0"/>
+              <a:t>CONTEXT</a:t>
+            </a:r>
+          </a:p>
+        </p:txBody>
+      </p:sp>
+      <p:sp>
+        <p:nvSpPr>
+          <p:cNvPr id="5" name="TextBox 4">
+            <a:extLst>
+              <a:ext uri="{FF2B5EF4-FFF2-40B4-BE49-F238E27FC236}">
+                <a16:creationId xmlns:a16="http://schemas.microsoft.com/office/drawing/2014/main" id="{330DD8F0-1658-AA3B-1092-34210E480B87}"/>
+              </a:ext>
+            </a:extLst>
+          </p:cNvPr>
+          <p:cNvSpPr txBox="1"/>
+          <p:nvPr/>
+        </p:nvSpPr>
+        <p:spPr>
+          <a:xfrm>
+            <a:off x="87085" y="5802086"/>
+            <a:ext cx="4093029" cy="769441"/>
+          </a:xfrm>
+          <a:prstGeom prst="rect">
+            <a:avLst/>
+          </a:prstGeom>
+          <a:noFill/>
+        </p:spPr>
+        <p:txBody>
+          <a:bodyPr wrap="square" rtlCol="0">
+            <a:spAutoFit/>
+          </a:bodyPr>
+          <a:lstStyle/>
+          <a:p>
+            <a:r>
+              <a:rPr lang="en-US" sz="4400" b="1" dirty="0"/>
+              <a:t>MIGRATION</a:t>
+            </a:r>
+          </a:p>
+        </p:txBody>
+      </p:sp>
+      <p:sp>
+        <p:nvSpPr>
+          <p:cNvPr id="6" name="TextBox 5">
+            <a:extLst>
+              <a:ext uri="{FF2B5EF4-FFF2-40B4-BE49-F238E27FC236}">
+                <a16:creationId xmlns:a16="http://schemas.microsoft.com/office/drawing/2014/main" id="{EDBF8D2B-FD24-A385-0656-B8C735CEE0AC}"/>
+              </a:ext>
+            </a:extLst>
+          </p:cNvPr>
+          <p:cNvSpPr txBox="1"/>
+          <p:nvPr/>
+        </p:nvSpPr>
+        <p:spPr>
+          <a:xfrm>
+            <a:off x="5464629" y="5802087"/>
+            <a:ext cx="4093029" cy="769441"/>
+          </a:xfrm>
+          <a:prstGeom prst="rect">
+            <a:avLst/>
+          </a:prstGeom>
+          <a:noFill/>
+        </p:spPr>
+        <p:txBody>
+          <a:bodyPr wrap="square" rtlCol="0">
+            <a:spAutoFit/>
+          </a:bodyPr>
+          <a:lstStyle/>
+          <a:p>
+            <a:r>
+              <a:rPr lang="en-US" sz="4400" b="1" dirty="0"/>
+              <a:t>URBANICITY</a:t>
+            </a:r>
+          </a:p>
+        </p:txBody>
+      </p:sp>
+      <p:sp>
+        <p:nvSpPr>
+          <p:cNvPr id="7" name="TextBox 6">
+            <a:extLst>
+              <a:ext uri="{FF2B5EF4-FFF2-40B4-BE49-F238E27FC236}">
+                <a16:creationId xmlns:a16="http://schemas.microsoft.com/office/drawing/2014/main" id="{5914DFFB-2A2C-4A0D-F961-07A5D17A187B}"/>
+              </a:ext>
+            </a:extLst>
+          </p:cNvPr>
+          <p:cNvSpPr txBox="1"/>
+          <p:nvPr/>
+        </p:nvSpPr>
+        <p:spPr>
+          <a:xfrm>
+            <a:off x="5050971" y="286473"/>
+            <a:ext cx="4093029" cy="769441"/>
+          </a:xfrm>
+          <a:prstGeom prst="rect">
+            <a:avLst/>
+          </a:prstGeom>
+          <a:noFill/>
+        </p:spPr>
+        <p:txBody>
+          <a:bodyPr wrap="square" rtlCol="0">
+            <a:spAutoFit/>
+          </a:bodyPr>
+          <a:lstStyle/>
+          <a:p>
+            <a:r>
+              <a:rPr lang="en-US" sz="4400" b="1" dirty="0"/>
+              <a:t>COMPOSITION</a:t>
+            </a:r>
+          </a:p>
+        </p:txBody>
+      </p:sp>
+      <p:cxnSp>
+        <p:nvCxnSpPr>
+          <p:cNvPr id="9" name="Straight Arrow Connector 8">
+            <a:extLst>
+              <a:ext uri="{FF2B5EF4-FFF2-40B4-BE49-F238E27FC236}">
+                <a16:creationId xmlns:a16="http://schemas.microsoft.com/office/drawing/2014/main" id="{8C2A192E-0C58-A606-7BD8-AD7E14443D39}"/>
+              </a:ext>
+            </a:extLst>
+          </p:cNvPr>
+          <p:cNvCxnSpPr>
+            <a:cxnSpLocks/>
+            <a:endCxn id="7" idx="1"/>
+          </p:cNvCxnSpPr>
+          <p:nvPr/>
+        </p:nvCxnSpPr>
+        <p:spPr>
+          <a:xfrm>
+            <a:off x="2852057" y="671193"/>
+            <a:ext cx="2198914" cy="1"/>
+          </a:xfrm>
+          <a:prstGeom prst="straightConnector1">
+            <a:avLst/>
+          </a:prstGeom>
+          <a:ln w="76200">
+            <a:headEnd type="triangle"/>
+            <a:tailEnd type="triangle"/>
+          </a:ln>
+        </p:spPr>
+        <p:style>
+          <a:lnRef idx="2">
+            <a:schemeClr val="dk1"/>
+          </a:lnRef>
+          <a:fillRef idx="0">
+            <a:schemeClr val="dk1"/>
+          </a:fillRef>
+          <a:effectRef idx="1">
+            <a:schemeClr val="dk1"/>
+          </a:effectRef>
+          <a:fontRef idx="minor">
+            <a:schemeClr val="tx1"/>
+          </a:fontRef>
+        </p:style>
+      </p:cxnSp>
+      <p:cxnSp>
+        <p:nvCxnSpPr>
+          <p:cNvPr id="15" name="Straight Arrow Connector 14">
+            <a:extLst>
+              <a:ext uri="{FF2B5EF4-FFF2-40B4-BE49-F238E27FC236}">
+                <a16:creationId xmlns:a16="http://schemas.microsoft.com/office/drawing/2014/main" id="{F7C0186F-C764-0199-4ED1-23EA6DA21816}"/>
+              </a:ext>
+            </a:extLst>
+          </p:cNvPr>
+          <p:cNvCxnSpPr>
+            <a:cxnSpLocks/>
+          </p:cNvCxnSpPr>
+          <p:nvPr/>
+        </p:nvCxnSpPr>
+        <p:spPr>
+          <a:xfrm>
+            <a:off x="3254829" y="6186806"/>
+            <a:ext cx="2198914" cy="1"/>
+          </a:xfrm>
+          <a:prstGeom prst="straightConnector1">
+            <a:avLst/>
+          </a:prstGeom>
+          <a:ln w="76200">
+            <a:headEnd type="triangle"/>
+            <a:tailEnd type="triangle"/>
+          </a:ln>
+        </p:spPr>
+        <p:style>
+          <a:lnRef idx="2">
+            <a:schemeClr val="dk1"/>
+          </a:lnRef>
+          <a:fillRef idx="0">
+            <a:schemeClr val="dk1"/>
+          </a:fillRef>
+          <a:effectRef idx="1">
+            <a:schemeClr val="dk1"/>
+          </a:effectRef>
+          <a:fontRef idx="minor">
+            <a:schemeClr val="tx1"/>
+          </a:fontRef>
+        </p:style>
+      </p:cxnSp>
+      <p:cxnSp>
+        <p:nvCxnSpPr>
+          <p:cNvPr id="16" name="Straight Arrow Connector 15">
+            <a:extLst>
+              <a:ext uri="{FF2B5EF4-FFF2-40B4-BE49-F238E27FC236}">
+                <a16:creationId xmlns:a16="http://schemas.microsoft.com/office/drawing/2014/main" id="{CDEE6D04-6CE6-A5FD-CCBB-AE6106981294}"/>
+              </a:ext>
+            </a:extLst>
+          </p:cNvPr>
+          <p:cNvCxnSpPr>
+            <a:cxnSpLocks/>
+          </p:cNvCxnSpPr>
+          <p:nvPr/>
+        </p:nvCxnSpPr>
+        <p:spPr>
+          <a:xfrm flipV="1">
+            <a:off x="1828800" y="899862"/>
+            <a:ext cx="0" cy="5021967"/>
+          </a:xfrm>
+          <a:prstGeom prst="straightConnector1">
+            <a:avLst/>
+          </a:prstGeom>
+          <a:ln w="76200">
+            <a:headEnd type="triangle"/>
+            <a:tailEnd type="triangle"/>
+          </a:ln>
+        </p:spPr>
+        <p:style>
+          <a:lnRef idx="2">
+            <a:schemeClr val="dk1"/>
+          </a:lnRef>
+          <a:fillRef idx="0">
+            <a:schemeClr val="dk1"/>
+          </a:fillRef>
+          <a:effectRef idx="1">
+            <a:schemeClr val="dk1"/>
+          </a:effectRef>
+          <a:fontRef idx="minor">
+            <a:schemeClr val="tx1"/>
+          </a:fontRef>
+        </p:style>
+      </p:cxnSp>
+      <p:cxnSp>
+        <p:nvCxnSpPr>
+          <p:cNvPr id="20" name="Straight Arrow Connector 19">
+            <a:extLst>
+              <a:ext uri="{FF2B5EF4-FFF2-40B4-BE49-F238E27FC236}">
+                <a16:creationId xmlns:a16="http://schemas.microsoft.com/office/drawing/2014/main" id="{CE5FA588-049F-7229-65CB-160513A3CAD3}"/>
+              </a:ext>
+            </a:extLst>
+          </p:cNvPr>
+          <p:cNvCxnSpPr>
+            <a:cxnSpLocks/>
+          </p:cNvCxnSpPr>
+          <p:nvPr/>
+        </p:nvCxnSpPr>
+        <p:spPr>
+          <a:xfrm>
+            <a:off x="7881257" y="899862"/>
+            <a:ext cx="0" cy="5021967"/>
+          </a:xfrm>
+          <a:prstGeom prst="straightConnector1">
+            <a:avLst/>
+          </a:prstGeom>
+          <a:ln w="76200">
+            <a:headEnd type="triangle"/>
+            <a:tailEnd type="triangle"/>
+          </a:ln>
+        </p:spPr>
+        <p:style>
+          <a:lnRef idx="2">
+            <a:schemeClr val="dk1"/>
+          </a:lnRef>
+          <a:fillRef idx="0">
+            <a:schemeClr val="dk1"/>
+          </a:fillRef>
+          <a:effectRef idx="1">
+            <a:schemeClr val="dk1"/>
+          </a:effectRef>
+          <a:fontRef idx="minor">
+            <a:schemeClr val="tx1"/>
+          </a:fontRef>
+        </p:style>
+      </p:cxnSp>
+      <p:cxnSp>
+        <p:nvCxnSpPr>
+          <p:cNvPr id="23" name="Straight Arrow Connector 22">
+            <a:extLst>
+              <a:ext uri="{FF2B5EF4-FFF2-40B4-BE49-F238E27FC236}">
+                <a16:creationId xmlns:a16="http://schemas.microsoft.com/office/drawing/2014/main" id="{6A537F19-A12D-B6C1-BEDE-3FA5303C8711}"/>
+              </a:ext>
+            </a:extLst>
+          </p:cNvPr>
+          <p:cNvCxnSpPr>
+            <a:cxnSpLocks/>
+          </p:cNvCxnSpPr>
+          <p:nvPr/>
+        </p:nvCxnSpPr>
+        <p:spPr>
+          <a:xfrm>
+            <a:off x="2438401" y="1008719"/>
+            <a:ext cx="4876799" cy="4913110"/>
+          </a:xfrm>
+          <a:prstGeom prst="straightConnector1">
+            <a:avLst/>
+          </a:prstGeom>
+          <a:ln w="76200">
+            <a:headEnd type="triangle"/>
+            <a:tailEnd type="triangle"/>
+          </a:ln>
+        </p:spPr>
+        <p:style>
+          <a:lnRef idx="2">
+            <a:schemeClr val="dk1"/>
+          </a:lnRef>
+          <a:fillRef idx="0">
+            <a:schemeClr val="dk1"/>
+          </a:fillRef>
+          <a:effectRef idx="1">
+            <a:schemeClr val="dk1"/>
+          </a:effectRef>
+          <a:fontRef idx="minor">
+            <a:schemeClr val="tx1"/>
+          </a:fontRef>
+        </p:style>
+      </p:cxnSp>
+      <p:cxnSp>
+        <p:nvCxnSpPr>
+          <p:cNvPr id="26" name="Straight Arrow Connector 25">
+            <a:extLst>
+              <a:ext uri="{FF2B5EF4-FFF2-40B4-BE49-F238E27FC236}">
+                <a16:creationId xmlns:a16="http://schemas.microsoft.com/office/drawing/2014/main" id="{E814B9E4-9F01-7CE1-8761-E9649041584E}"/>
+              </a:ext>
+            </a:extLst>
+          </p:cNvPr>
+          <p:cNvCxnSpPr>
+            <a:cxnSpLocks/>
+          </p:cNvCxnSpPr>
+          <p:nvPr/>
+        </p:nvCxnSpPr>
+        <p:spPr>
+          <a:xfrm flipV="1">
+            <a:off x="2351313" y="936171"/>
+            <a:ext cx="4539344" cy="4985658"/>
+          </a:xfrm>
+          <a:prstGeom prst="straightConnector1">
+            <a:avLst/>
+          </a:prstGeom>
+          <a:ln w="76200">
+            <a:headEnd type="triangle"/>
+            <a:tailEnd type="triangle"/>
+          </a:ln>
+        </p:spPr>
+        <p:style>
+          <a:lnRef idx="2">
+            <a:schemeClr val="dk1"/>
+          </a:lnRef>
+          <a:fillRef idx="0">
+            <a:schemeClr val="dk1"/>
+          </a:fillRef>
+          <a:effectRef idx="1">
+            <a:schemeClr val="dk1"/>
+          </a:effectRef>
+          <a:fontRef idx="minor">
+            <a:schemeClr val="tx1"/>
+          </a:fontRef>
+        </p:style>
+      </p:cxnSp>
+      <p:sp>
+        <p:nvSpPr>
+          <p:cNvPr id="3" name="TextBox 2">
+            <a:extLst>
+              <a:ext uri="{FF2B5EF4-FFF2-40B4-BE49-F238E27FC236}">
+                <a16:creationId xmlns:a16="http://schemas.microsoft.com/office/drawing/2014/main" id="{BB3CD841-30C5-C637-FEB0-6905985E7B3D}"/>
+              </a:ext>
+            </a:extLst>
+          </p:cNvPr>
+          <p:cNvSpPr txBox="1"/>
+          <p:nvPr/>
+        </p:nvSpPr>
+        <p:spPr>
+          <a:xfrm>
+            <a:off x="185058" y="1050463"/>
+            <a:ext cx="2566679" cy="1200329"/>
+          </a:xfrm>
+          <a:prstGeom prst="rect">
+            <a:avLst/>
+          </a:prstGeom>
+          <a:solidFill>
+            <a:schemeClr val="bg1">
+              <a:lumMod val="95000"/>
+              <a:alpha val="86000"/>
+            </a:schemeClr>
+          </a:solidFill>
+        </p:spPr>
+        <p:txBody>
+          <a:bodyPr wrap="square" rtlCol="0">
+            <a:spAutoFit/>
+          </a:bodyPr>
+          <a:lstStyle/>
+          <a:p>
+            <a:r>
+              <a:rPr lang="en-US" sz="2400" b="1" dirty="0">
+                <a:solidFill>
+                  <a:srgbClr val="9C1212"/>
+                </a:solidFill>
+                <a:effectLst>
+                  <a:outerShdw blurRad="38100" dist="38100" dir="2700000" algn="tl">
+                    <a:srgbClr val="000000">
+                      <a:alpha val="43137"/>
+                    </a:srgbClr>
+                  </a:outerShdw>
+                </a:effectLst>
+              </a:rPr>
+              <a:t>Public university</a:t>
+            </a:r>
+          </a:p>
+          <a:p>
+            <a:r>
+              <a:rPr lang="en-US" sz="2400" b="1" dirty="0">
+                <a:solidFill>
+                  <a:srgbClr val="9C1212"/>
+                </a:solidFill>
+                <a:effectLst>
+                  <a:outerShdw blurRad="38100" dist="38100" dir="2700000" algn="tl">
+                    <a:srgbClr val="000000">
+                      <a:alpha val="43137"/>
+                    </a:srgbClr>
+                  </a:outerShdw>
+                </a:effectLst>
+              </a:rPr>
+              <a:t>Isthmus </a:t>
+            </a:r>
+          </a:p>
+          <a:p>
+            <a:r>
+              <a:rPr lang="en-US" sz="2400" b="1" dirty="0">
+                <a:solidFill>
+                  <a:srgbClr val="9C1212"/>
+                </a:solidFill>
+                <a:effectLst>
+                  <a:outerShdw blurRad="38100" dist="38100" dir="2700000" algn="tl">
+                    <a:srgbClr val="000000">
+                      <a:alpha val="43137"/>
+                    </a:srgbClr>
+                  </a:outerShdw>
+                </a:effectLst>
+              </a:rPr>
+              <a:t>State Capital</a:t>
+            </a:r>
+            <a:endParaRPr lang="en-US" sz="2000" b="1" dirty="0">
+              <a:solidFill>
+                <a:srgbClr val="9C1212"/>
+              </a:solidFill>
+              <a:effectLst>
+                <a:outerShdw blurRad="38100" dist="38100" dir="2700000" algn="tl">
+                  <a:srgbClr val="000000">
+                    <a:alpha val="43137"/>
+                  </a:srgbClr>
+                </a:outerShdw>
+              </a:effectLst>
+            </a:endParaRPr>
+          </a:p>
+        </p:txBody>
+      </p:sp>
+      <p:sp>
+        <p:nvSpPr>
+          <p:cNvPr id="8" name="TextBox 7">
+            <a:extLst>
+              <a:ext uri="{FF2B5EF4-FFF2-40B4-BE49-F238E27FC236}">
+                <a16:creationId xmlns:a16="http://schemas.microsoft.com/office/drawing/2014/main" id="{15916F99-10C7-5A85-3030-8531B5A7EB6E}"/>
+              </a:ext>
+            </a:extLst>
+          </p:cNvPr>
+          <p:cNvSpPr txBox="1"/>
+          <p:nvPr/>
+        </p:nvSpPr>
+        <p:spPr>
+          <a:xfrm>
+            <a:off x="5926239" y="1050463"/>
+            <a:ext cx="2877956" cy="1200329"/>
+          </a:xfrm>
+          <a:prstGeom prst="rect">
+            <a:avLst/>
+          </a:prstGeom>
+          <a:solidFill>
+            <a:schemeClr val="bg1">
+              <a:lumMod val="95000"/>
+              <a:alpha val="86000"/>
+            </a:schemeClr>
+          </a:solidFill>
+        </p:spPr>
+        <p:txBody>
+          <a:bodyPr wrap="square" rtlCol="0">
+            <a:spAutoFit/>
+          </a:bodyPr>
+          <a:lstStyle/>
+          <a:p>
+            <a:pPr algn="r"/>
+            <a:r>
+              <a:rPr lang="en-US" sz="2400" b="1" dirty="0">
+                <a:solidFill>
+                  <a:srgbClr val="9C1212"/>
+                </a:solidFill>
+                <a:effectLst>
+                  <a:outerShdw blurRad="38100" dist="38100" dir="2700000" algn="tl">
+                    <a:srgbClr val="000000">
+                      <a:alpha val="43137"/>
+                    </a:srgbClr>
+                  </a:outerShdw>
+                </a:effectLst>
+              </a:rPr>
+              <a:t>Students </a:t>
+            </a:r>
+          </a:p>
+          <a:p>
+            <a:pPr algn="r"/>
+            <a:r>
+              <a:rPr lang="en-US" sz="2400" b="1" dirty="0">
+                <a:solidFill>
+                  <a:srgbClr val="9C1212"/>
+                </a:solidFill>
+                <a:effectLst>
+                  <a:outerShdw blurRad="38100" dist="38100" dir="2700000" algn="tl">
+                    <a:srgbClr val="000000">
+                      <a:alpha val="43137"/>
+                    </a:srgbClr>
+                  </a:outerShdw>
+                </a:effectLst>
+              </a:rPr>
+              <a:t>Politically engaged</a:t>
+            </a:r>
+          </a:p>
+          <a:p>
+            <a:pPr algn="r"/>
+            <a:r>
+              <a:rPr lang="en-US" sz="2400" b="1" dirty="0">
+                <a:solidFill>
+                  <a:srgbClr val="9C1212"/>
+                </a:solidFill>
+                <a:effectLst>
+                  <a:outerShdw blurRad="38100" dist="38100" dir="2700000" algn="tl">
+                    <a:srgbClr val="000000">
+                      <a:alpha val="43137"/>
+                    </a:srgbClr>
+                  </a:outerShdw>
+                </a:effectLst>
+              </a:rPr>
+              <a:t>Physically active</a:t>
+            </a:r>
+          </a:p>
+        </p:txBody>
+      </p:sp>
+      <p:sp>
+        <p:nvSpPr>
+          <p:cNvPr id="2" name="TextBox 1">
+            <a:extLst>
+              <a:ext uri="{FF2B5EF4-FFF2-40B4-BE49-F238E27FC236}">
+                <a16:creationId xmlns:a16="http://schemas.microsoft.com/office/drawing/2014/main" id="{67FB6DBC-F79A-D2E2-3433-D3B7D36DD9A6}"/>
+              </a:ext>
+            </a:extLst>
+          </p:cNvPr>
+          <p:cNvSpPr txBox="1"/>
+          <p:nvPr/>
+        </p:nvSpPr>
+        <p:spPr>
+          <a:xfrm>
+            <a:off x="3015343" y="2952711"/>
+            <a:ext cx="3189514" cy="646331"/>
+          </a:xfrm>
+          <a:prstGeom prst="rect">
+            <a:avLst/>
+          </a:prstGeom>
+          <a:solidFill>
+            <a:schemeClr val="bg1">
+              <a:lumMod val="95000"/>
+              <a:alpha val="86000"/>
+            </a:schemeClr>
+          </a:solidFill>
+        </p:spPr>
+        <p:txBody>
+          <a:bodyPr wrap="square" rtlCol="0">
+            <a:spAutoFit/>
+          </a:bodyPr>
+          <a:lstStyle/>
+          <a:p>
+            <a:pPr algn="ctr"/>
+            <a:r>
+              <a:rPr lang="en-US" sz="3600" b="1" dirty="0">
+                <a:solidFill>
+                  <a:srgbClr val="000000"/>
+                </a:solidFill>
+                <a:effectLst>
+                  <a:outerShdw blurRad="38100" dist="38100" dir="2700000" algn="tl">
+                    <a:srgbClr val="000000">
+                      <a:alpha val="43137"/>
+                    </a:srgbClr>
+                  </a:outerShdw>
+                </a:effectLst>
+              </a:rPr>
+              <a:t>MADISON, WI</a:t>
+            </a:r>
+          </a:p>
+        </p:txBody>
+      </p:sp>
+    </p:spTree>
+    <p:extLst>
+      <p:ext uri="{BB962C8B-B14F-4D97-AF65-F5344CB8AC3E}">
+        <p14:creationId xmlns:p14="http://schemas.microsoft.com/office/powerpoint/2010/main" val="3530351724"/>
+      </p:ext>
+    </p:extLst>
+  </p:cSld>
+  <p:clrMapOvr>
+    <a:masterClrMapping/>
+  </p:clrMapOvr>
+</p:sld>
+</file>
+
+<file path=ppt/slides/slide6.xml><?xml version="1.0" encoding="utf-8"?>
+<p:sld xmlns:a="http://schemas.openxmlformats.org/drawingml/2006/main" xmlns:r="http://schemas.openxmlformats.org/officeDocument/2006/relationships" xmlns:p="http://schemas.openxmlformats.org/presentationml/2006/main">
+  <p:cSld>
+    <p:spTree>
+      <p:nvGrpSpPr>
+        <p:cNvPr id="1" name="">
+          <a:extLst>
+            <a:ext uri="{FF2B5EF4-FFF2-40B4-BE49-F238E27FC236}">
+              <a16:creationId xmlns:a16="http://schemas.microsoft.com/office/drawing/2014/main" id="{0A135836-8F26-27CB-FB35-8B71A515A08E}"/>
+            </a:ext>
+          </a:extLst>
+        </p:cNvPr>
+        <p:cNvGrpSpPr/>
+        <p:nvPr/>
+      </p:nvGrpSpPr>
+      <p:grpSpPr>
+        <a:xfrm>
+          <a:off x="0" y="0"/>
+          <a:ext cx="0" cy="0"/>
+          <a:chOff x="0" y="0"/>
+          <a:chExt cx="0" cy="0"/>
+        </a:xfrm>
+      </p:grpSpPr>
+      <p:sp>
+        <p:nvSpPr>
+          <p:cNvPr id="4" name="TextBox 3">
+            <a:extLst>
+              <a:ext uri="{FF2B5EF4-FFF2-40B4-BE49-F238E27FC236}">
+                <a16:creationId xmlns:a16="http://schemas.microsoft.com/office/drawing/2014/main" id="{D931E47F-B5D3-F4C4-5C74-DC006B1A20D4}"/>
+              </a:ext>
+            </a:extLst>
+          </p:cNvPr>
+          <p:cNvSpPr txBox="1"/>
+          <p:nvPr/>
+        </p:nvSpPr>
+        <p:spPr>
+          <a:xfrm>
+            <a:off x="185058" y="257226"/>
+            <a:ext cx="4093029" cy="769441"/>
+          </a:xfrm>
+          <a:prstGeom prst="rect">
+            <a:avLst/>
+          </a:prstGeom>
+          <a:noFill/>
+        </p:spPr>
+        <p:txBody>
+          <a:bodyPr wrap="square" rtlCol="0">
+            <a:spAutoFit/>
+          </a:bodyPr>
+          <a:lstStyle/>
+          <a:p>
+            <a:r>
+              <a:rPr lang="en-US" sz="4400" b="1" dirty="0"/>
+              <a:t>CONTEXT</a:t>
+            </a:r>
+          </a:p>
+        </p:txBody>
+      </p:sp>
+      <p:sp>
+        <p:nvSpPr>
+          <p:cNvPr id="5" name="TextBox 4">
+            <a:extLst>
+              <a:ext uri="{FF2B5EF4-FFF2-40B4-BE49-F238E27FC236}">
+                <a16:creationId xmlns:a16="http://schemas.microsoft.com/office/drawing/2014/main" id="{05FE6EAF-4FB6-C26B-BB8B-1EB053598FEB}"/>
+              </a:ext>
+            </a:extLst>
+          </p:cNvPr>
+          <p:cNvSpPr txBox="1"/>
+          <p:nvPr/>
+        </p:nvSpPr>
+        <p:spPr>
+          <a:xfrm>
+            <a:off x="87085" y="5802086"/>
+            <a:ext cx="4093029" cy="769441"/>
+          </a:xfrm>
+          <a:prstGeom prst="rect">
+            <a:avLst/>
+          </a:prstGeom>
+          <a:noFill/>
+        </p:spPr>
+        <p:txBody>
+          <a:bodyPr wrap="square" rtlCol="0">
+            <a:spAutoFit/>
+          </a:bodyPr>
+          <a:lstStyle/>
+          <a:p>
+            <a:r>
+              <a:rPr lang="en-US" sz="4400" b="1" dirty="0"/>
+              <a:t>MIGRATION</a:t>
+            </a:r>
+          </a:p>
+        </p:txBody>
+      </p:sp>
+      <p:sp>
+        <p:nvSpPr>
+          <p:cNvPr id="6" name="TextBox 5">
+            <a:extLst>
+              <a:ext uri="{FF2B5EF4-FFF2-40B4-BE49-F238E27FC236}">
+                <a16:creationId xmlns:a16="http://schemas.microsoft.com/office/drawing/2014/main" id="{1DD0A2BC-1B5B-6971-4554-991B93DCE9D2}"/>
+              </a:ext>
+            </a:extLst>
+          </p:cNvPr>
+          <p:cNvSpPr txBox="1"/>
+          <p:nvPr/>
+        </p:nvSpPr>
+        <p:spPr>
+          <a:xfrm>
+            <a:off x="5464629" y="5802087"/>
+            <a:ext cx="4093029" cy="769441"/>
+          </a:xfrm>
+          <a:prstGeom prst="rect">
+            <a:avLst/>
+          </a:prstGeom>
+          <a:noFill/>
+        </p:spPr>
+        <p:txBody>
+          <a:bodyPr wrap="square" rtlCol="0">
+            <a:spAutoFit/>
+          </a:bodyPr>
+          <a:lstStyle/>
+          <a:p>
+            <a:r>
+              <a:rPr lang="en-US" sz="4400" b="1" dirty="0"/>
+              <a:t>URBANICITY</a:t>
+            </a:r>
+          </a:p>
+        </p:txBody>
+      </p:sp>
+      <p:sp>
+        <p:nvSpPr>
+          <p:cNvPr id="7" name="TextBox 6">
+            <a:extLst>
+              <a:ext uri="{FF2B5EF4-FFF2-40B4-BE49-F238E27FC236}">
+                <a16:creationId xmlns:a16="http://schemas.microsoft.com/office/drawing/2014/main" id="{D650F345-4090-25DB-3A48-164D7856D1A6}"/>
+              </a:ext>
+            </a:extLst>
+          </p:cNvPr>
+          <p:cNvSpPr txBox="1"/>
+          <p:nvPr/>
+        </p:nvSpPr>
+        <p:spPr>
+          <a:xfrm>
+            <a:off x="5050971" y="286473"/>
+            <a:ext cx="4093029" cy="769441"/>
+          </a:xfrm>
+          <a:prstGeom prst="rect">
+            <a:avLst/>
+          </a:prstGeom>
+          <a:noFill/>
+        </p:spPr>
+        <p:txBody>
+          <a:bodyPr wrap="square" rtlCol="0">
+            <a:spAutoFit/>
+          </a:bodyPr>
+          <a:lstStyle/>
+          <a:p>
+            <a:r>
+              <a:rPr lang="en-US" sz="4400" b="1" dirty="0"/>
+              <a:t>COMPOSITION</a:t>
+            </a:r>
+          </a:p>
+        </p:txBody>
+      </p:sp>
+      <p:cxnSp>
+        <p:nvCxnSpPr>
+          <p:cNvPr id="9" name="Straight Arrow Connector 8">
+            <a:extLst>
+              <a:ext uri="{FF2B5EF4-FFF2-40B4-BE49-F238E27FC236}">
+                <a16:creationId xmlns:a16="http://schemas.microsoft.com/office/drawing/2014/main" id="{7F7F110B-15CB-A575-9637-FF5A264A7509}"/>
+              </a:ext>
+            </a:extLst>
+          </p:cNvPr>
+          <p:cNvCxnSpPr>
+            <a:cxnSpLocks/>
+            <a:endCxn id="7" idx="1"/>
+          </p:cNvCxnSpPr>
+          <p:nvPr/>
+        </p:nvCxnSpPr>
+        <p:spPr>
+          <a:xfrm>
+            <a:off x="2852057" y="671193"/>
+            <a:ext cx="2198914" cy="1"/>
+          </a:xfrm>
+          <a:prstGeom prst="straightConnector1">
+            <a:avLst/>
+          </a:prstGeom>
+          <a:ln w="76200">
+            <a:headEnd type="triangle"/>
+            <a:tailEnd type="triangle"/>
+          </a:ln>
+        </p:spPr>
+        <p:style>
+          <a:lnRef idx="2">
+            <a:schemeClr val="dk1"/>
+          </a:lnRef>
+          <a:fillRef idx="0">
+            <a:schemeClr val="dk1"/>
+          </a:fillRef>
+          <a:effectRef idx="1">
+            <a:schemeClr val="dk1"/>
+          </a:effectRef>
+          <a:fontRef idx="minor">
+            <a:schemeClr val="tx1"/>
+          </a:fontRef>
+        </p:style>
+      </p:cxnSp>
+      <p:cxnSp>
+        <p:nvCxnSpPr>
+          <p:cNvPr id="15" name="Straight Arrow Connector 14">
+            <a:extLst>
+              <a:ext uri="{FF2B5EF4-FFF2-40B4-BE49-F238E27FC236}">
+                <a16:creationId xmlns:a16="http://schemas.microsoft.com/office/drawing/2014/main" id="{45C1290A-8E06-609D-3D08-1870EC27A992}"/>
+              </a:ext>
+            </a:extLst>
+          </p:cNvPr>
+          <p:cNvCxnSpPr>
+            <a:cxnSpLocks/>
+          </p:cNvCxnSpPr>
+          <p:nvPr/>
+        </p:nvCxnSpPr>
+        <p:spPr>
+          <a:xfrm>
+            <a:off x="3254829" y="6186806"/>
+            <a:ext cx="2198914" cy="1"/>
+          </a:xfrm>
+          <a:prstGeom prst="straightConnector1">
+            <a:avLst/>
+          </a:prstGeom>
+          <a:ln w="76200">
+            <a:headEnd type="triangle"/>
+            <a:tailEnd type="triangle"/>
+          </a:ln>
+        </p:spPr>
+        <p:style>
+          <a:lnRef idx="2">
+            <a:schemeClr val="dk1"/>
+          </a:lnRef>
+          <a:fillRef idx="0">
+            <a:schemeClr val="dk1"/>
+          </a:fillRef>
+          <a:effectRef idx="1">
+            <a:schemeClr val="dk1"/>
+          </a:effectRef>
+          <a:fontRef idx="minor">
+            <a:schemeClr val="tx1"/>
+          </a:fontRef>
+        </p:style>
+      </p:cxnSp>
+      <p:cxnSp>
+        <p:nvCxnSpPr>
+          <p:cNvPr id="16" name="Straight Arrow Connector 15">
+            <a:extLst>
+              <a:ext uri="{FF2B5EF4-FFF2-40B4-BE49-F238E27FC236}">
+                <a16:creationId xmlns:a16="http://schemas.microsoft.com/office/drawing/2014/main" id="{74248463-9F92-2B7E-BE4C-55177614DD21}"/>
+              </a:ext>
+            </a:extLst>
+          </p:cNvPr>
+          <p:cNvCxnSpPr>
+            <a:cxnSpLocks/>
+          </p:cNvCxnSpPr>
+          <p:nvPr/>
+        </p:nvCxnSpPr>
+        <p:spPr>
+          <a:xfrm flipV="1">
+            <a:off x="1828800" y="899862"/>
+            <a:ext cx="0" cy="5021967"/>
+          </a:xfrm>
+          <a:prstGeom prst="straightConnector1">
+            <a:avLst/>
+          </a:prstGeom>
+          <a:ln w="76200">
+            <a:headEnd type="triangle"/>
+            <a:tailEnd type="triangle"/>
+          </a:ln>
+        </p:spPr>
+        <p:style>
+          <a:lnRef idx="2">
+            <a:schemeClr val="dk1"/>
+          </a:lnRef>
+          <a:fillRef idx="0">
+            <a:schemeClr val="dk1"/>
+          </a:fillRef>
+          <a:effectRef idx="1">
+            <a:schemeClr val="dk1"/>
+          </a:effectRef>
+          <a:fontRef idx="minor">
+            <a:schemeClr val="tx1"/>
+          </a:fontRef>
+        </p:style>
+      </p:cxnSp>
+      <p:cxnSp>
+        <p:nvCxnSpPr>
+          <p:cNvPr id="20" name="Straight Arrow Connector 19">
+            <a:extLst>
+              <a:ext uri="{FF2B5EF4-FFF2-40B4-BE49-F238E27FC236}">
+                <a16:creationId xmlns:a16="http://schemas.microsoft.com/office/drawing/2014/main" id="{9230C77F-F12D-7F27-CB6D-74D1D9B15434}"/>
+              </a:ext>
+            </a:extLst>
+          </p:cNvPr>
+          <p:cNvCxnSpPr>
+            <a:cxnSpLocks/>
+          </p:cNvCxnSpPr>
+          <p:nvPr/>
+        </p:nvCxnSpPr>
+        <p:spPr>
+          <a:xfrm>
+            <a:off x="7881257" y="899862"/>
+            <a:ext cx="0" cy="5021967"/>
+          </a:xfrm>
+          <a:prstGeom prst="straightConnector1">
+            <a:avLst/>
+          </a:prstGeom>
+          <a:ln w="76200">
+            <a:headEnd type="triangle"/>
+            <a:tailEnd type="triangle"/>
+          </a:ln>
+        </p:spPr>
+        <p:style>
+          <a:lnRef idx="2">
+            <a:schemeClr val="dk1"/>
+          </a:lnRef>
+          <a:fillRef idx="0">
+            <a:schemeClr val="dk1"/>
+          </a:fillRef>
+          <a:effectRef idx="1">
+            <a:schemeClr val="dk1"/>
+          </a:effectRef>
+          <a:fontRef idx="minor">
+            <a:schemeClr val="tx1"/>
+          </a:fontRef>
+        </p:style>
+      </p:cxnSp>
+      <p:cxnSp>
+        <p:nvCxnSpPr>
+          <p:cNvPr id="23" name="Straight Arrow Connector 22">
+            <a:extLst>
+              <a:ext uri="{FF2B5EF4-FFF2-40B4-BE49-F238E27FC236}">
+                <a16:creationId xmlns:a16="http://schemas.microsoft.com/office/drawing/2014/main" id="{E8E27735-2403-DE5F-7DB3-DA4391A1D97C}"/>
+              </a:ext>
+            </a:extLst>
+          </p:cNvPr>
+          <p:cNvCxnSpPr>
+            <a:cxnSpLocks/>
+          </p:cNvCxnSpPr>
+          <p:nvPr/>
+        </p:nvCxnSpPr>
+        <p:spPr>
+          <a:xfrm>
+            <a:off x="2438401" y="1008719"/>
+            <a:ext cx="4876799" cy="4913110"/>
+          </a:xfrm>
+          <a:prstGeom prst="straightConnector1">
+            <a:avLst/>
+          </a:prstGeom>
+          <a:ln w="76200">
+            <a:headEnd type="triangle"/>
+            <a:tailEnd type="triangle"/>
+          </a:ln>
+        </p:spPr>
+        <p:style>
+          <a:lnRef idx="2">
+            <a:schemeClr val="dk1"/>
+          </a:lnRef>
+          <a:fillRef idx="0">
+            <a:schemeClr val="dk1"/>
+          </a:fillRef>
+          <a:effectRef idx="1">
+            <a:schemeClr val="dk1"/>
+          </a:effectRef>
+          <a:fontRef idx="minor">
+            <a:schemeClr val="tx1"/>
+          </a:fontRef>
+        </p:style>
+      </p:cxnSp>
+      <p:cxnSp>
+        <p:nvCxnSpPr>
+          <p:cNvPr id="26" name="Straight Arrow Connector 25">
+            <a:extLst>
+              <a:ext uri="{FF2B5EF4-FFF2-40B4-BE49-F238E27FC236}">
+                <a16:creationId xmlns:a16="http://schemas.microsoft.com/office/drawing/2014/main" id="{69229028-060A-F6C5-3FA6-9C4338701842}"/>
+              </a:ext>
+            </a:extLst>
+          </p:cNvPr>
+          <p:cNvCxnSpPr>
+            <a:cxnSpLocks/>
+          </p:cNvCxnSpPr>
+          <p:nvPr/>
+        </p:nvCxnSpPr>
+        <p:spPr>
+          <a:xfrm flipV="1">
+            <a:off x="2351313" y="936171"/>
+            <a:ext cx="4539344" cy="4985658"/>
+          </a:xfrm>
+          <a:prstGeom prst="straightConnector1">
+            <a:avLst/>
+          </a:prstGeom>
+          <a:ln w="76200">
+            <a:headEnd type="triangle"/>
+            <a:tailEnd type="triangle"/>
+          </a:ln>
+        </p:spPr>
+        <p:style>
+          <a:lnRef idx="2">
+            <a:schemeClr val="dk1"/>
+          </a:lnRef>
+          <a:fillRef idx="0">
+            <a:schemeClr val="dk1"/>
+          </a:fillRef>
+          <a:effectRef idx="1">
+            <a:schemeClr val="dk1"/>
+          </a:effectRef>
+          <a:fontRef idx="minor">
+            <a:schemeClr val="tx1"/>
+          </a:fontRef>
+        </p:style>
+      </p:cxnSp>
+      <p:sp>
+        <p:nvSpPr>
+          <p:cNvPr id="3" name="TextBox 2">
+            <a:extLst>
+              <a:ext uri="{FF2B5EF4-FFF2-40B4-BE49-F238E27FC236}">
+                <a16:creationId xmlns:a16="http://schemas.microsoft.com/office/drawing/2014/main" id="{B1C660F9-2C25-A0B1-3BA6-6D3FFA96C4E1}"/>
+              </a:ext>
+            </a:extLst>
+          </p:cNvPr>
+          <p:cNvSpPr txBox="1"/>
+          <p:nvPr/>
+        </p:nvSpPr>
+        <p:spPr>
+          <a:xfrm>
+            <a:off x="185058" y="1050463"/>
+            <a:ext cx="2566679" cy="1200329"/>
+          </a:xfrm>
+          <a:prstGeom prst="rect">
+            <a:avLst/>
+          </a:prstGeom>
+          <a:solidFill>
+            <a:schemeClr val="bg1">
+              <a:lumMod val="95000"/>
+              <a:alpha val="86000"/>
+            </a:schemeClr>
+          </a:solidFill>
+        </p:spPr>
+        <p:txBody>
+          <a:bodyPr wrap="square" rtlCol="0">
+            <a:spAutoFit/>
+          </a:bodyPr>
+          <a:lstStyle/>
+          <a:p>
+            <a:r>
+              <a:rPr lang="en-US" sz="2400" b="1" dirty="0">
+                <a:solidFill>
+                  <a:srgbClr val="9C1212"/>
+                </a:solidFill>
+                <a:effectLst>
+                  <a:outerShdw blurRad="38100" dist="38100" dir="2700000" algn="tl">
+                    <a:srgbClr val="000000">
+                      <a:alpha val="43137"/>
+                    </a:srgbClr>
+                  </a:outerShdw>
+                </a:effectLst>
+              </a:rPr>
+              <a:t>Public university</a:t>
+            </a:r>
+          </a:p>
+          <a:p>
+            <a:r>
+              <a:rPr lang="en-US" sz="2400" b="1" dirty="0">
+                <a:solidFill>
+                  <a:srgbClr val="9C1212"/>
+                </a:solidFill>
+                <a:effectLst>
+                  <a:outerShdw blurRad="38100" dist="38100" dir="2700000" algn="tl">
+                    <a:srgbClr val="000000">
+                      <a:alpha val="43137"/>
+                    </a:srgbClr>
+                  </a:outerShdw>
+                </a:effectLst>
+              </a:rPr>
+              <a:t>Isthmus </a:t>
+            </a:r>
+          </a:p>
+          <a:p>
+            <a:r>
+              <a:rPr lang="en-US" sz="2400" b="1" dirty="0">
+                <a:solidFill>
+                  <a:srgbClr val="9C1212"/>
+                </a:solidFill>
+                <a:effectLst>
+                  <a:outerShdw blurRad="38100" dist="38100" dir="2700000" algn="tl">
+                    <a:srgbClr val="000000">
+                      <a:alpha val="43137"/>
+                    </a:srgbClr>
+                  </a:outerShdw>
+                </a:effectLst>
+              </a:rPr>
+              <a:t>State Capital</a:t>
+            </a:r>
+            <a:endParaRPr lang="en-US" sz="2000" b="1" dirty="0">
+              <a:solidFill>
+                <a:srgbClr val="9C1212"/>
+              </a:solidFill>
+              <a:effectLst>
+                <a:outerShdw blurRad="38100" dist="38100" dir="2700000" algn="tl">
+                  <a:srgbClr val="000000">
+                    <a:alpha val="43137"/>
+                  </a:srgbClr>
+                </a:outerShdw>
+              </a:effectLst>
+            </a:endParaRPr>
+          </a:p>
+        </p:txBody>
+      </p:sp>
+      <p:sp>
+        <p:nvSpPr>
+          <p:cNvPr id="8" name="TextBox 7">
+            <a:extLst>
+              <a:ext uri="{FF2B5EF4-FFF2-40B4-BE49-F238E27FC236}">
+                <a16:creationId xmlns:a16="http://schemas.microsoft.com/office/drawing/2014/main" id="{F988B7CA-F2F7-9132-4AA1-9F38D6947562}"/>
+              </a:ext>
+            </a:extLst>
+          </p:cNvPr>
+          <p:cNvSpPr txBox="1"/>
+          <p:nvPr/>
+        </p:nvSpPr>
+        <p:spPr>
+          <a:xfrm>
+            <a:off x="5926239" y="1050463"/>
+            <a:ext cx="2877956" cy="1200329"/>
+          </a:xfrm>
+          <a:prstGeom prst="rect">
+            <a:avLst/>
+          </a:prstGeom>
+          <a:solidFill>
+            <a:schemeClr val="bg1">
+              <a:lumMod val="95000"/>
+              <a:alpha val="86000"/>
+            </a:schemeClr>
+          </a:solidFill>
+        </p:spPr>
+        <p:txBody>
+          <a:bodyPr wrap="square" rtlCol="0">
+            <a:spAutoFit/>
+          </a:bodyPr>
+          <a:lstStyle/>
+          <a:p>
+            <a:pPr algn="r"/>
+            <a:r>
+              <a:rPr lang="en-US" sz="2400" b="1" dirty="0">
+                <a:solidFill>
+                  <a:srgbClr val="9C1212"/>
+                </a:solidFill>
+                <a:effectLst>
+                  <a:outerShdw blurRad="38100" dist="38100" dir="2700000" algn="tl">
+                    <a:srgbClr val="000000">
+                      <a:alpha val="43137"/>
+                    </a:srgbClr>
+                  </a:outerShdw>
+                </a:effectLst>
+              </a:rPr>
+              <a:t>Students </a:t>
+            </a:r>
+          </a:p>
+          <a:p>
+            <a:pPr algn="r"/>
+            <a:r>
+              <a:rPr lang="en-US" sz="2400" b="1" dirty="0">
+                <a:solidFill>
+                  <a:srgbClr val="9C1212"/>
+                </a:solidFill>
+                <a:effectLst>
+                  <a:outerShdw blurRad="38100" dist="38100" dir="2700000" algn="tl">
+                    <a:srgbClr val="000000">
+                      <a:alpha val="43137"/>
+                    </a:srgbClr>
+                  </a:outerShdw>
+                </a:effectLst>
+              </a:rPr>
+              <a:t>Politically engaged</a:t>
+            </a:r>
+          </a:p>
+          <a:p>
+            <a:pPr algn="r"/>
+            <a:r>
+              <a:rPr lang="en-US" sz="2400" b="1" dirty="0">
+                <a:solidFill>
+                  <a:srgbClr val="9C1212"/>
+                </a:solidFill>
+                <a:effectLst>
+                  <a:outerShdw blurRad="38100" dist="38100" dir="2700000" algn="tl">
+                    <a:srgbClr val="000000">
+                      <a:alpha val="43137"/>
+                    </a:srgbClr>
+                  </a:outerShdw>
+                </a:effectLst>
+              </a:rPr>
+              <a:t>Physically active</a:t>
+            </a:r>
+          </a:p>
+        </p:txBody>
+      </p:sp>
+      <p:sp>
+        <p:nvSpPr>
+          <p:cNvPr id="10" name="TextBox 9">
+            <a:extLst>
+              <a:ext uri="{FF2B5EF4-FFF2-40B4-BE49-F238E27FC236}">
+                <a16:creationId xmlns:a16="http://schemas.microsoft.com/office/drawing/2014/main" id="{4C22F75C-BF4A-C7B9-F02D-044CEB726E37}"/>
+              </a:ext>
+            </a:extLst>
+          </p:cNvPr>
+          <p:cNvSpPr txBox="1"/>
+          <p:nvPr/>
+        </p:nvSpPr>
+        <p:spPr>
+          <a:xfrm>
+            <a:off x="185057" y="4600956"/>
+            <a:ext cx="4973537" cy="1200329"/>
+          </a:xfrm>
+          <a:prstGeom prst="rect">
+            <a:avLst/>
+          </a:prstGeom>
+          <a:solidFill>
+            <a:schemeClr val="bg1">
+              <a:lumMod val="95000"/>
+              <a:alpha val="86000"/>
+            </a:schemeClr>
+          </a:solidFill>
+        </p:spPr>
+        <p:txBody>
+          <a:bodyPr wrap="square" rtlCol="0">
+            <a:spAutoFit/>
+          </a:bodyPr>
+          <a:lstStyle/>
+          <a:p>
+            <a:r>
+              <a:rPr lang="en-US" sz="2400" b="1" dirty="0">
+                <a:solidFill>
+                  <a:srgbClr val="9C1212"/>
+                </a:solidFill>
+                <a:effectLst>
+                  <a:outerShdw blurRad="38100" dist="38100" dir="2700000" algn="tl">
+                    <a:srgbClr val="000000">
+                      <a:alpha val="43137"/>
+                    </a:srgbClr>
+                  </a:outerShdw>
+                </a:effectLst>
+              </a:rPr>
+              <a:t>Academic calendar </a:t>
+            </a:r>
+          </a:p>
+          <a:p>
+            <a:r>
+              <a:rPr lang="en-US" sz="2400" b="1" dirty="0">
+                <a:solidFill>
+                  <a:srgbClr val="9C1212"/>
+                </a:solidFill>
+                <a:effectLst>
+                  <a:outerShdw blurRad="38100" dist="38100" dir="2700000" algn="tl">
+                    <a:srgbClr val="000000">
+                      <a:alpha val="43137"/>
+                    </a:srgbClr>
+                  </a:outerShdw>
+                </a:effectLst>
+              </a:rPr>
+              <a:t>University staff, state employees </a:t>
+            </a:r>
+          </a:p>
+          <a:p>
+            <a:r>
+              <a:rPr lang="en-US" sz="2400" b="1" dirty="0">
+                <a:solidFill>
+                  <a:srgbClr val="9C1212"/>
+                </a:solidFill>
+                <a:effectLst>
+                  <a:outerShdw blurRad="38100" dist="38100" dir="2700000" algn="tl">
+                    <a:srgbClr val="000000">
+                      <a:alpha val="43137"/>
+                    </a:srgbClr>
+                  </a:outerShdw>
+                </a:effectLst>
+              </a:rPr>
+              <a:t>Wisconsinites and Midwesterners  </a:t>
+            </a:r>
+          </a:p>
+        </p:txBody>
+      </p:sp>
+      <p:sp>
+        <p:nvSpPr>
+          <p:cNvPr id="2" name="TextBox 1">
+            <a:extLst>
+              <a:ext uri="{FF2B5EF4-FFF2-40B4-BE49-F238E27FC236}">
+                <a16:creationId xmlns:a16="http://schemas.microsoft.com/office/drawing/2014/main" id="{58226EA6-DFD3-8A9E-D311-46695392EC32}"/>
+              </a:ext>
+            </a:extLst>
+          </p:cNvPr>
+          <p:cNvSpPr txBox="1"/>
+          <p:nvPr/>
+        </p:nvSpPr>
+        <p:spPr>
+          <a:xfrm>
+            <a:off x="3015343" y="2952711"/>
+            <a:ext cx="3189514" cy="646331"/>
+          </a:xfrm>
+          <a:prstGeom prst="rect">
+            <a:avLst/>
+          </a:prstGeom>
+          <a:solidFill>
+            <a:schemeClr val="bg1">
+              <a:lumMod val="95000"/>
+              <a:alpha val="86000"/>
+            </a:schemeClr>
+          </a:solidFill>
+        </p:spPr>
+        <p:txBody>
+          <a:bodyPr wrap="square" rtlCol="0">
+            <a:spAutoFit/>
+          </a:bodyPr>
+          <a:lstStyle/>
+          <a:p>
+            <a:pPr algn="ctr"/>
+            <a:r>
+              <a:rPr lang="en-US" sz="3600" b="1" dirty="0">
+                <a:solidFill>
+                  <a:srgbClr val="000000"/>
+                </a:solidFill>
+                <a:effectLst>
+                  <a:outerShdw blurRad="38100" dist="38100" dir="2700000" algn="tl">
+                    <a:srgbClr val="000000">
+                      <a:alpha val="43137"/>
+                    </a:srgbClr>
+                  </a:outerShdw>
+                </a:effectLst>
+              </a:rPr>
+              <a:t>MADISON, WI</a:t>
+            </a:r>
+          </a:p>
+        </p:txBody>
+      </p:sp>
+    </p:spTree>
+    <p:extLst>
+      <p:ext uri="{BB962C8B-B14F-4D97-AF65-F5344CB8AC3E}">
+        <p14:creationId xmlns:p14="http://schemas.microsoft.com/office/powerpoint/2010/main" val="4093375851"/>
+      </p:ext>
+    </p:extLst>
+  </p:cSld>
+  <p:clrMapOvr>
+    <a:masterClrMapping/>
+  </p:clrMapOvr>
+</p:sld>
+</file>
+
+<file path=ppt/slides/slide7.xml><?xml version="1.0" encoding="utf-8"?>
+<p:sld xmlns:a="http://schemas.openxmlformats.org/drawingml/2006/main" xmlns:r="http://schemas.openxmlformats.org/officeDocument/2006/relationships" xmlns:p="http://schemas.openxmlformats.org/presentationml/2006/main">
+  <p:cSld>
+    <p:spTree>
+      <p:nvGrpSpPr>
+        <p:cNvPr id="1" name="">
+          <a:extLst>
+            <a:ext uri="{FF2B5EF4-FFF2-40B4-BE49-F238E27FC236}">
+              <a16:creationId xmlns:a16="http://schemas.microsoft.com/office/drawing/2014/main" id="{7A2D644E-A99E-B55A-39A9-1EF3707211BE}"/>
+            </a:ext>
+          </a:extLst>
+        </p:cNvPr>
+        <p:cNvGrpSpPr/>
+        <p:nvPr/>
+      </p:nvGrpSpPr>
+      <p:grpSpPr>
+        <a:xfrm>
+          <a:off x="0" y="0"/>
+          <a:ext cx="0" cy="0"/>
+          <a:chOff x="0" y="0"/>
+          <a:chExt cx="0" cy="0"/>
+        </a:xfrm>
+      </p:grpSpPr>
+      <p:sp>
+        <p:nvSpPr>
+          <p:cNvPr id="4" name="TextBox 3">
+            <a:extLst>
+              <a:ext uri="{FF2B5EF4-FFF2-40B4-BE49-F238E27FC236}">
+                <a16:creationId xmlns:a16="http://schemas.microsoft.com/office/drawing/2014/main" id="{FD483ACA-B7FD-6FA1-B62D-80A51EF8B099}"/>
+              </a:ext>
+            </a:extLst>
+          </p:cNvPr>
+          <p:cNvSpPr txBox="1"/>
+          <p:nvPr/>
+        </p:nvSpPr>
+        <p:spPr>
+          <a:xfrm>
+            <a:off x="185058" y="257226"/>
+            <a:ext cx="4093029" cy="769441"/>
+          </a:xfrm>
+          <a:prstGeom prst="rect">
+            <a:avLst/>
+          </a:prstGeom>
+          <a:noFill/>
+        </p:spPr>
+        <p:txBody>
+          <a:bodyPr wrap="square" rtlCol="0">
+            <a:spAutoFit/>
+          </a:bodyPr>
+          <a:lstStyle/>
+          <a:p>
+            <a:r>
+              <a:rPr lang="en-US" sz="4400" b="1" dirty="0"/>
+              <a:t>CONTEXT</a:t>
+            </a:r>
+          </a:p>
+        </p:txBody>
+      </p:sp>
+      <p:sp>
+        <p:nvSpPr>
+          <p:cNvPr id="5" name="TextBox 4">
+            <a:extLst>
+              <a:ext uri="{FF2B5EF4-FFF2-40B4-BE49-F238E27FC236}">
+                <a16:creationId xmlns:a16="http://schemas.microsoft.com/office/drawing/2014/main" id="{B5975EF7-C506-B045-170D-BD1C8F8D48CC}"/>
+              </a:ext>
+            </a:extLst>
+          </p:cNvPr>
+          <p:cNvSpPr txBox="1"/>
+          <p:nvPr/>
+        </p:nvSpPr>
+        <p:spPr>
+          <a:xfrm>
+            <a:off x="87085" y="5802086"/>
+            <a:ext cx="4093029" cy="769441"/>
+          </a:xfrm>
+          <a:prstGeom prst="rect">
+            <a:avLst/>
+          </a:prstGeom>
+          <a:noFill/>
+        </p:spPr>
+        <p:txBody>
+          <a:bodyPr wrap="square" rtlCol="0">
+            <a:spAutoFit/>
+          </a:bodyPr>
+          <a:lstStyle/>
+          <a:p>
+            <a:r>
+              <a:rPr lang="en-US" sz="4400" b="1" dirty="0"/>
+              <a:t>MIGRATION</a:t>
+            </a:r>
+          </a:p>
+        </p:txBody>
+      </p:sp>
+      <p:sp>
+        <p:nvSpPr>
+          <p:cNvPr id="6" name="TextBox 5">
+            <a:extLst>
+              <a:ext uri="{FF2B5EF4-FFF2-40B4-BE49-F238E27FC236}">
+                <a16:creationId xmlns:a16="http://schemas.microsoft.com/office/drawing/2014/main" id="{CCF3F3EA-6FE7-AA93-76C8-A5DD763631BE}"/>
+              </a:ext>
+            </a:extLst>
+          </p:cNvPr>
+          <p:cNvSpPr txBox="1"/>
+          <p:nvPr/>
+        </p:nvSpPr>
+        <p:spPr>
+          <a:xfrm>
+            <a:off x="5464629" y="5802087"/>
+            <a:ext cx="4093029" cy="769441"/>
+          </a:xfrm>
+          <a:prstGeom prst="rect">
+            <a:avLst/>
+          </a:prstGeom>
+          <a:noFill/>
+        </p:spPr>
+        <p:txBody>
+          <a:bodyPr wrap="square" rtlCol="0">
+            <a:spAutoFit/>
+          </a:bodyPr>
+          <a:lstStyle/>
+          <a:p>
+            <a:r>
+              <a:rPr lang="en-US" sz="4400" b="1" dirty="0"/>
+              <a:t>URBANICITY</a:t>
+            </a:r>
+          </a:p>
+        </p:txBody>
+      </p:sp>
+      <p:sp>
+        <p:nvSpPr>
+          <p:cNvPr id="7" name="TextBox 6">
+            <a:extLst>
+              <a:ext uri="{FF2B5EF4-FFF2-40B4-BE49-F238E27FC236}">
+                <a16:creationId xmlns:a16="http://schemas.microsoft.com/office/drawing/2014/main" id="{4E618ABA-621E-BA3E-7CB0-29DDB383982A}"/>
+              </a:ext>
+            </a:extLst>
+          </p:cNvPr>
+          <p:cNvSpPr txBox="1"/>
+          <p:nvPr/>
+        </p:nvSpPr>
+        <p:spPr>
+          <a:xfrm>
+            <a:off x="5050971" y="286473"/>
+            <a:ext cx="4093029" cy="769441"/>
+          </a:xfrm>
+          <a:prstGeom prst="rect">
+            <a:avLst/>
+          </a:prstGeom>
+          <a:noFill/>
+        </p:spPr>
+        <p:txBody>
+          <a:bodyPr wrap="square" rtlCol="0">
+            <a:spAutoFit/>
+          </a:bodyPr>
+          <a:lstStyle/>
+          <a:p>
+            <a:r>
+              <a:rPr lang="en-US" sz="4400" b="1" dirty="0"/>
+              <a:t>COMPOSITION</a:t>
+            </a:r>
+          </a:p>
+        </p:txBody>
+      </p:sp>
+      <p:cxnSp>
+        <p:nvCxnSpPr>
+          <p:cNvPr id="9" name="Straight Arrow Connector 8">
+            <a:extLst>
+              <a:ext uri="{FF2B5EF4-FFF2-40B4-BE49-F238E27FC236}">
+                <a16:creationId xmlns:a16="http://schemas.microsoft.com/office/drawing/2014/main" id="{636020AA-8C86-3164-DC33-DDEE94FD1C0F}"/>
+              </a:ext>
+            </a:extLst>
+          </p:cNvPr>
+          <p:cNvCxnSpPr>
+            <a:cxnSpLocks/>
+            <a:endCxn id="7" idx="1"/>
+          </p:cNvCxnSpPr>
+          <p:nvPr/>
+        </p:nvCxnSpPr>
+        <p:spPr>
+          <a:xfrm>
+            <a:off x="2852057" y="671193"/>
+            <a:ext cx="2198914" cy="1"/>
+          </a:xfrm>
+          <a:prstGeom prst="straightConnector1">
+            <a:avLst/>
+          </a:prstGeom>
+          <a:ln w="76200">
+            <a:headEnd type="triangle"/>
+            <a:tailEnd type="triangle"/>
+          </a:ln>
+        </p:spPr>
+        <p:style>
+          <a:lnRef idx="2">
+            <a:schemeClr val="dk1"/>
+          </a:lnRef>
+          <a:fillRef idx="0">
+            <a:schemeClr val="dk1"/>
+          </a:fillRef>
+          <a:effectRef idx="1">
+            <a:schemeClr val="dk1"/>
+          </a:effectRef>
+          <a:fontRef idx="minor">
+            <a:schemeClr val="tx1"/>
+          </a:fontRef>
+        </p:style>
+      </p:cxnSp>
+      <p:cxnSp>
+        <p:nvCxnSpPr>
+          <p:cNvPr id="15" name="Straight Arrow Connector 14">
+            <a:extLst>
+              <a:ext uri="{FF2B5EF4-FFF2-40B4-BE49-F238E27FC236}">
+                <a16:creationId xmlns:a16="http://schemas.microsoft.com/office/drawing/2014/main" id="{47C6B0C4-EB92-6092-2488-F6F18F387458}"/>
+              </a:ext>
+            </a:extLst>
+          </p:cNvPr>
+          <p:cNvCxnSpPr>
+            <a:cxnSpLocks/>
+          </p:cNvCxnSpPr>
+          <p:nvPr/>
+        </p:nvCxnSpPr>
+        <p:spPr>
+          <a:xfrm>
+            <a:off x="3254829" y="6186806"/>
+            <a:ext cx="2198914" cy="1"/>
+          </a:xfrm>
+          <a:prstGeom prst="straightConnector1">
+            <a:avLst/>
+          </a:prstGeom>
+          <a:ln w="76200">
+            <a:headEnd type="triangle"/>
+            <a:tailEnd type="triangle"/>
+          </a:ln>
+        </p:spPr>
+        <p:style>
+          <a:lnRef idx="2">
+            <a:schemeClr val="dk1"/>
+          </a:lnRef>
+          <a:fillRef idx="0">
+            <a:schemeClr val="dk1"/>
+          </a:fillRef>
+          <a:effectRef idx="1">
+            <a:schemeClr val="dk1"/>
+          </a:effectRef>
+          <a:fontRef idx="minor">
+            <a:schemeClr val="tx1"/>
+          </a:fontRef>
+        </p:style>
+      </p:cxnSp>
+      <p:cxnSp>
+        <p:nvCxnSpPr>
+          <p:cNvPr id="16" name="Straight Arrow Connector 15">
+            <a:extLst>
+              <a:ext uri="{FF2B5EF4-FFF2-40B4-BE49-F238E27FC236}">
+                <a16:creationId xmlns:a16="http://schemas.microsoft.com/office/drawing/2014/main" id="{AEAA3E7B-47EE-CA4A-57ED-8EB8BDBB11C0}"/>
+              </a:ext>
+            </a:extLst>
+          </p:cNvPr>
+          <p:cNvCxnSpPr>
+            <a:cxnSpLocks/>
+          </p:cNvCxnSpPr>
+          <p:nvPr/>
+        </p:nvCxnSpPr>
+        <p:spPr>
+          <a:xfrm flipV="1">
+            <a:off x="1828800" y="899862"/>
+            <a:ext cx="0" cy="5021967"/>
+          </a:xfrm>
+          <a:prstGeom prst="straightConnector1">
+            <a:avLst/>
+          </a:prstGeom>
+          <a:ln w="76200">
+            <a:headEnd type="triangle"/>
+            <a:tailEnd type="triangle"/>
+          </a:ln>
+        </p:spPr>
+        <p:style>
+          <a:lnRef idx="2">
+            <a:schemeClr val="dk1"/>
+          </a:lnRef>
+          <a:fillRef idx="0">
+            <a:schemeClr val="dk1"/>
+          </a:fillRef>
+          <a:effectRef idx="1">
+            <a:schemeClr val="dk1"/>
+          </a:effectRef>
+          <a:fontRef idx="minor">
+            <a:schemeClr val="tx1"/>
+          </a:fontRef>
+        </p:style>
+      </p:cxnSp>
+      <p:cxnSp>
+        <p:nvCxnSpPr>
+          <p:cNvPr id="20" name="Straight Arrow Connector 19">
+            <a:extLst>
+              <a:ext uri="{FF2B5EF4-FFF2-40B4-BE49-F238E27FC236}">
+                <a16:creationId xmlns:a16="http://schemas.microsoft.com/office/drawing/2014/main" id="{2BD833BD-DB67-B11C-C55A-64D206678666}"/>
+              </a:ext>
+            </a:extLst>
+          </p:cNvPr>
+          <p:cNvCxnSpPr>
+            <a:cxnSpLocks/>
+          </p:cNvCxnSpPr>
+          <p:nvPr/>
+        </p:nvCxnSpPr>
+        <p:spPr>
+          <a:xfrm>
+            <a:off x="7881257" y="899862"/>
+            <a:ext cx="0" cy="5021967"/>
+          </a:xfrm>
+          <a:prstGeom prst="straightConnector1">
+            <a:avLst/>
+          </a:prstGeom>
+          <a:ln w="76200">
+            <a:headEnd type="triangle"/>
+            <a:tailEnd type="triangle"/>
+          </a:ln>
+        </p:spPr>
+        <p:style>
+          <a:lnRef idx="2">
+            <a:schemeClr val="dk1"/>
+          </a:lnRef>
+          <a:fillRef idx="0">
+            <a:schemeClr val="dk1"/>
+          </a:fillRef>
+          <a:effectRef idx="1">
+            <a:schemeClr val="dk1"/>
+          </a:effectRef>
+          <a:fontRef idx="minor">
+            <a:schemeClr val="tx1"/>
+          </a:fontRef>
+        </p:style>
+      </p:cxnSp>
+      <p:cxnSp>
+        <p:nvCxnSpPr>
+          <p:cNvPr id="23" name="Straight Arrow Connector 22">
+            <a:extLst>
+              <a:ext uri="{FF2B5EF4-FFF2-40B4-BE49-F238E27FC236}">
+                <a16:creationId xmlns:a16="http://schemas.microsoft.com/office/drawing/2014/main" id="{675DE49D-7DEF-BC4E-A9D0-075C6BA696FD}"/>
+              </a:ext>
+            </a:extLst>
+          </p:cNvPr>
+          <p:cNvCxnSpPr>
+            <a:cxnSpLocks/>
+          </p:cNvCxnSpPr>
+          <p:nvPr/>
+        </p:nvCxnSpPr>
+        <p:spPr>
+          <a:xfrm>
+            <a:off x="2438401" y="1008719"/>
+            <a:ext cx="4876799" cy="4913110"/>
+          </a:xfrm>
+          <a:prstGeom prst="straightConnector1">
+            <a:avLst/>
+          </a:prstGeom>
+          <a:ln w="76200">
+            <a:headEnd type="triangle"/>
+            <a:tailEnd type="triangle"/>
+          </a:ln>
+        </p:spPr>
+        <p:style>
+          <a:lnRef idx="2">
+            <a:schemeClr val="dk1"/>
+          </a:lnRef>
+          <a:fillRef idx="0">
+            <a:schemeClr val="dk1"/>
+          </a:fillRef>
+          <a:effectRef idx="1">
+            <a:schemeClr val="dk1"/>
+          </a:effectRef>
+          <a:fontRef idx="minor">
+            <a:schemeClr val="tx1"/>
+          </a:fontRef>
+        </p:style>
+      </p:cxnSp>
+      <p:cxnSp>
+        <p:nvCxnSpPr>
+          <p:cNvPr id="26" name="Straight Arrow Connector 25">
+            <a:extLst>
+              <a:ext uri="{FF2B5EF4-FFF2-40B4-BE49-F238E27FC236}">
+                <a16:creationId xmlns:a16="http://schemas.microsoft.com/office/drawing/2014/main" id="{D575A991-719F-E74E-DF56-F61B9F1CC753}"/>
+              </a:ext>
+            </a:extLst>
+          </p:cNvPr>
+          <p:cNvCxnSpPr>
+            <a:cxnSpLocks/>
+          </p:cNvCxnSpPr>
+          <p:nvPr/>
+        </p:nvCxnSpPr>
+        <p:spPr>
+          <a:xfrm flipV="1">
+            <a:off x="2351313" y="936171"/>
+            <a:ext cx="4539344" cy="4985658"/>
+          </a:xfrm>
+          <a:prstGeom prst="straightConnector1">
+            <a:avLst/>
+          </a:prstGeom>
+          <a:ln w="76200">
+            <a:headEnd type="triangle"/>
+            <a:tailEnd type="triangle"/>
+          </a:ln>
+        </p:spPr>
+        <p:style>
+          <a:lnRef idx="2">
+            <a:schemeClr val="dk1"/>
+          </a:lnRef>
+          <a:fillRef idx="0">
+            <a:schemeClr val="dk1"/>
+          </a:fillRef>
+          <a:effectRef idx="1">
+            <a:schemeClr val="dk1"/>
+          </a:effectRef>
+          <a:fontRef idx="minor">
+            <a:schemeClr val="tx1"/>
+          </a:fontRef>
+        </p:style>
+      </p:cxnSp>
+      <p:sp>
+        <p:nvSpPr>
+          <p:cNvPr id="3" name="TextBox 2">
+            <a:extLst>
+              <a:ext uri="{FF2B5EF4-FFF2-40B4-BE49-F238E27FC236}">
+                <a16:creationId xmlns:a16="http://schemas.microsoft.com/office/drawing/2014/main" id="{AB8C5F6E-9271-8B99-559A-5DBB819DC611}"/>
+              </a:ext>
+            </a:extLst>
+          </p:cNvPr>
+          <p:cNvSpPr txBox="1"/>
+          <p:nvPr/>
+        </p:nvSpPr>
+        <p:spPr>
+          <a:xfrm>
+            <a:off x="185058" y="1050463"/>
+            <a:ext cx="2566679" cy="1200329"/>
+          </a:xfrm>
+          <a:prstGeom prst="rect">
+            <a:avLst/>
+          </a:prstGeom>
+          <a:solidFill>
+            <a:schemeClr val="bg1">
+              <a:lumMod val="95000"/>
+              <a:alpha val="86000"/>
+            </a:schemeClr>
+          </a:solidFill>
+        </p:spPr>
+        <p:txBody>
+          <a:bodyPr wrap="square" rtlCol="0">
+            <a:spAutoFit/>
+          </a:bodyPr>
+          <a:lstStyle/>
+          <a:p>
+            <a:r>
+              <a:rPr lang="en-US" sz="2400" b="1" dirty="0">
+                <a:solidFill>
+                  <a:srgbClr val="9C1212"/>
+                </a:solidFill>
+                <a:effectLst>
+                  <a:outerShdw blurRad="38100" dist="38100" dir="2700000" algn="tl">
+                    <a:srgbClr val="000000">
+                      <a:alpha val="43137"/>
+                    </a:srgbClr>
+                  </a:outerShdw>
+                </a:effectLst>
+              </a:rPr>
+              <a:t>Public university</a:t>
+            </a:r>
+          </a:p>
+          <a:p>
+            <a:r>
+              <a:rPr lang="en-US" sz="2400" b="1" dirty="0">
+                <a:solidFill>
+                  <a:srgbClr val="9C1212"/>
+                </a:solidFill>
+                <a:effectLst>
+                  <a:outerShdw blurRad="38100" dist="38100" dir="2700000" algn="tl">
+                    <a:srgbClr val="000000">
+                      <a:alpha val="43137"/>
+                    </a:srgbClr>
+                  </a:outerShdw>
+                </a:effectLst>
+              </a:rPr>
+              <a:t>Isthmus </a:t>
+            </a:r>
+          </a:p>
+          <a:p>
+            <a:r>
+              <a:rPr lang="en-US" sz="2400" b="1" dirty="0">
+                <a:solidFill>
+                  <a:srgbClr val="9C1212"/>
+                </a:solidFill>
+                <a:effectLst>
+                  <a:outerShdw blurRad="38100" dist="38100" dir="2700000" algn="tl">
+                    <a:srgbClr val="000000">
+                      <a:alpha val="43137"/>
+                    </a:srgbClr>
+                  </a:outerShdw>
+                </a:effectLst>
+              </a:rPr>
+              <a:t>State Capital</a:t>
+            </a:r>
+            <a:endParaRPr lang="en-US" sz="2000" b="1" dirty="0">
+              <a:solidFill>
+                <a:srgbClr val="9C1212"/>
+              </a:solidFill>
+              <a:effectLst>
+                <a:outerShdw blurRad="38100" dist="38100" dir="2700000" algn="tl">
+                  <a:srgbClr val="000000">
+                    <a:alpha val="43137"/>
+                  </a:srgbClr>
+                </a:outerShdw>
+              </a:effectLst>
+            </a:endParaRPr>
+          </a:p>
+        </p:txBody>
+      </p:sp>
+      <p:sp>
+        <p:nvSpPr>
+          <p:cNvPr id="8" name="TextBox 7">
+            <a:extLst>
+              <a:ext uri="{FF2B5EF4-FFF2-40B4-BE49-F238E27FC236}">
+                <a16:creationId xmlns:a16="http://schemas.microsoft.com/office/drawing/2014/main" id="{51614C6E-9C35-97A3-271C-3037E3B3136D}"/>
+              </a:ext>
+            </a:extLst>
+          </p:cNvPr>
+          <p:cNvSpPr txBox="1"/>
+          <p:nvPr/>
+        </p:nvSpPr>
+        <p:spPr>
+          <a:xfrm>
+            <a:off x="5926239" y="1050463"/>
+            <a:ext cx="2877956" cy="1200329"/>
+          </a:xfrm>
+          <a:prstGeom prst="rect">
+            <a:avLst/>
+          </a:prstGeom>
+          <a:solidFill>
+            <a:schemeClr val="bg1">
+              <a:lumMod val="95000"/>
+              <a:alpha val="86000"/>
+            </a:schemeClr>
+          </a:solidFill>
+        </p:spPr>
+        <p:txBody>
+          <a:bodyPr wrap="square" rtlCol="0">
+            <a:spAutoFit/>
+          </a:bodyPr>
+          <a:lstStyle/>
+          <a:p>
+            <a:pPr algn="r"/>
+            <a:r>
+              <a:rPr lang="en-US" sz="2400" b="1" dirty="0">
+                <a:solidFill>
+                  <a:srgbClr val="9C1212"/>
+                </a:solidFill>
+                <a:effectLst>
+                  <a:outerShdw blurRad="38100" dist="38100" dir="2700000" algn="tl">
+                    <a:srgbClr val="000000">
+                      <a:alpha val="43137"/>
+                    </a:srgbClr>
+                  </a:outerShdw>
+                </a:effectLst>
+              </a:rPr>
+              <a:t>Students </a:t>
+            </a:r>
+          </a:p>
+          <a:p>
+            <a:pPr algn="r"/>
+            <a:r>
+              <a:rPr lang="en-US" sz="2400" b="1" dirty="0">
+                <a:solidFill>
+                  <a:srgbClr val="9C1212"/>
+                </a:solidFill>
+                <a:effectLst>
+                  <a:outerShdw blurRad="38100" dist="38100" dir="2700000" algn="tl">
+                    <a:srgbClr val="000000">
+                      <a:alpha val="43137"/>
+                    </a:srgbClr>
+                  </a:outerShdw>
+                </a:effectLst>
+              </a:rPr>
+              <a:t>Politically engaged</a:t>
+            </a:r>
+          </a:p>
+          <a:p>
+            <a:pPr algn="r"/>
+            <a:r>
+              <a:rPr lang="en-US" sz="2400" b="1" dirty="0">
+                <a:solidFill>
+                  <a:srgbClr val="9C1212"/>
+                </a:solidFill>
+                <a:effectLst>
+                  <a:outerShdw blurRad="38100" dist="38100" dir="2700000" algn="tl">
+                    <a:srgbClr val="000000">
+                      <a:alpha val="43137"/>
+                    </a:srgbClr>
+                  </a:outerShdw>
+                </a:effectLst>
+              </a:rPr>
+              <a:t>Physically active</a:t>
+            </a:r>
+          </a:p>
+        </p:txBody>
+      </p:sp>
+      <p:sp>
+        <p:nvSpPr>
+          <p:cNvPr id="10" name="TextBox 9">
+            <a:extLst>
+              <a:ext uri="{FF2B5EF4-FFF2-40B4-BE49-F238E27FC236}">
+                <a16:creationId xmlns:a16="http://schemas.microsoft.com/office/drawing/2014/main" id="{96927C9C-BA3A-3446-B993-2C43DFC4A6B1}"/>
+              </a:ext>
+            </a:extLst>
+          </p:cNvPr>
+          <p:cNvSpPr txBox="1"/>
+          <p:nvPr/>
+        </p:nvSpPr>
+        <p:spPr>
+          <a:xfrm>
+            <a:off x="185057" y="4600956"/>
+            <a:ext cx="4973537" cy="1200329"/>
+          </a:xfrm>
+          <a:prstGeom prst="rect">
+            <a:avLst/>
+          </a:prstGeom>
+          <a:solidFill>
+            <a:schemeClr val="bg1">
+              <a:lumMod val="95000"/>
+              <a:alpha val="86000"/>
+            </a:schemeClr>
+          </a:solidFill>
+        </p:spPr>
+        <p:txBody>
+          <a:bodyPr wrap="square" rtlCol="0">
+            <a:spAutoFit/>
+          </a:bodyPr>
+          <a:lstStyle/>
+          <a:p>
+            <a:r>
+              <a:rPr lang="en-US" sz="2400" b="1" dirty="0">
+                <a:solidFill>
+                  <a:srgbClr val="9C1212"/>
+                </a:solidFill>
+                <a:effectLst>
+                  <a:outerShdw blurRad="38100" dist="38100" dir="2700000" algn="tl">
+                    <a:srgbClr val="000000">
+                      <a:alpha val="43137"/>
+                    </a:srgbClr>
+                  </a:outerShdw>
+                </a:effectLst>
+              </a:rPr>
+              <a:t>Academic calendar </a:t>
+            </a:r>
+          </a:p>
+          <a:p>
+            <a:r>
+              <a:rPr lang="en-US" sz="2400" b="1" dirty="0">
+                <a:solidFill>
+                  <a:srgbClr val="9C1212"/>
+                </a:solidFill>
+                <a:effectLst>
+                  <a:outerShdw blurRad="38100" dist="38100" dir="2700000" algn="tl">
+                    <a:srgbClr val="000000">
+                      <a:alpha val="43137"/>
+                    </a:srgbClr>
+                  </a:outerShdw>
+                </a:effectLst>
+              </a:rPr>
+              <a:t>University staff, state employees </a:t>
+            </a:r>
+          </a:p>
+          <a:p>
+            <a:r>
+              <a:rPr lang="en-US" sz="2400" b="1" dirty="0">
+                <a:solidFill>
+                  <a:srgbClr val="9C1212"/>
+                </a:solidFill>
+                <a:effectLst>
+                  <a:outerShdw blurRad="38100" dist="38100" dir="2700000" algn="tl">
+                    <a:srgbClr val="000000">
+                      <a:alpha val="43137"/>
+                    </a:srgbClr>
+                  </a:outerShdw>
+                </a:effectLst>
+              </a:rPr>
+              <a:t>Wisconsinites and Midwesterners  </a:t>
+            </a:r>
+          </a:p>
+        </p:txBody>
+      </p:sp>
+      <p:sp>
+        <p:nvSpPr>
+          <p:cNvPr id="11" name="TextBox 10">
+            <a:extLst>
+              <a:ext uri="{FF2B5EF4-FFF2-40B4-BE49-F238E27FC236}">
+                <a16:creationId xmlns:a16="http://schemas.microsoft.com/office/drawing/2014/main" id="{38BC9263-89DB-C4EA-40DB-6843264CAFB1}"/>
+              </a:ext>
+            </a:extLst>
+          </p:cNvPr>
+          <p:cNvSpPr txBox="1"/>
+          <p:nvPr/>
+        </p:nvSpPr>
+        <p:spPr>
+          <a:xfrm>
+            <a:off x="5681106" y="4600956"/>
+            <a:ext cx="3123089" cy="1200329"/>
+          </a:xfrm>
+          <a:prstGeom prst="rect">
+            <a:avLst/>
+          </a:prstGeom>
+          <a:solidFill>
+            <a:schemeClr val="bg1">
+              <a:lumMod val="95000"/>
+              <a:alpha val="86000"/>
+            </a:schemeClr>
+          </a:solidFill>
+        </p:spPr>
+        <p:txBody>
+          <a:bodyPr wrap="square" rtlCol="0">
+            <a:spAutoFit/>
+          </a:bodyPr>
+          <a:lstStyle/>
+          <a:p>
+            <a:pPr algn="r"/>
+            <a:r>
+              <a:rPr lang="en-US" sz="2400" b="1" dirty="0">
+                <a:solidFill>
+                  <a:srgbClr val="9C1212"/>
+                </a:solidFill>
+                <a:effectLst>
+                  <a:outerShdw blurRad="38100" dist="38100" dir="2700000" algn="tl">
+                    <a:srgbClr val="000000">
+                      <a:alpha val="43137"/>
+                    </a:srgbClr>
+                  </a:outerShdw>
+                </a:effectLst>
+              </a:rPr>
+              <a:t>Medium metro</a:t>
+            </a:r>
+          </a:p>
+          <a:p>
+            <a:pPr algn="r"/>
+            <a:r>
+              <a:rPr lang="en-US" sz="2400" b="1" dirty="0">
+                <a:solidFill>
+                  <a:srgbClr val="9C1212"/>
+                </a:solidFill>
+                <a:effectLst>
+                  <a:outerShdw blurRad="38100" dist="38100" dir="2700000" algn="tl">
+                    <a:srgbClr val="000000">
+                      <a:alpha val="43137"/>
+                    </a:srgbClr>
+                  </a:outerShdw>
+                </a:effectLst>
+              </a:rPr>
+              <a:t>Sprawling </a:t>
+            </a:r>
+          </a:p>
+          <a:p>
+            <a:pPr algn="r"/>
+            <a:r>
+              <a:rPr lang="en-US" sz="2400" b="1" dirty="0">
+                <a:solidFill>
+                  <a:srgbClr val="9C1212"/>
+                </a:solidFill>
+                <a:effectLst>
+                  <a:outerShdw blurRad="38100" dist="38100" dir="2700000" algn="tl">
+                    <a:srgbClr val="000000">
+                      <a:alpha val="43137"/>
+                    </a:srgbClr>
+                  </a:outerShdw>
+                </a:effectLst>
+              </a:rPr>
+              <a:t>Lots of green spaces</a:t>
+            </a:r>
+            <a:r>
+              <a:rPr lang="en-US" sz="2000" b="1" dirty="0">
+                <a:effectLst>
+                  <a:outerShdw blurRad="38100" dist="38100" dir="2700000" algn="tl">
+                    <a:srgbClr val="000000">
+                      <a:alpha val="43137"/>
+                    </a:srgbClr>
+                  </a:outerShdw>
+                </a:effectLst>
+              </a:rPr>
+              <a:t>  </a:t>
+            </a:r>
+          </a:p>
+        </p:txBody>
+      </p:sp>
+      <p:sp>
+        <p:nvSpPr>
+          <p:cNvPr id="2" name="TextBox 1">
+            <a:extLst>
+              <a:ext uri="{FF2B5EF4-FFF2-40B4-BE49-F238E27FC236}">
+                <a16:creationId xmlns:a16="http://schemas.microsoft.com/office/drawing/2014/main" id="{64CBEC2B-3A87-CB43-7EFD-9BFDF591031A}"/>
+              </a:ext>
+            </a:extLst>
+          </p:cNvPr>
+          <p:cNvSpPr txBox="1"/>
+          <p:nvPr/>
+        </p:nvSpPr>
+        <p:spPr>
+          <a:xfrm>
+            <a:off x="3015343" y="2952711"/>
+            <a:ext cx="3189514" cy="646331"/>
+          </a:xfrm>
+          <a:prstGeom prst="rect">
+            <a:avLst/>
+          </a:prstGeom>
+          <a:solidFill>
+            <a:schemeClr val="bg1">
+              <a:lumMod val="95000"/>
+              <a:alpha val="86000"/>
+            </a:schemeClr>
+          </a:solidFill>
+        </p:spPr>
+        <p:txBody>
+          <a:bodyPr wrap="square" rtlCol="0">
+            <a:spAutoFit/>
+          </a:bodyPr>
+          <a:lstStyle/>
+          <a:p>
+            <a:pPr algn="ctr"/>
+            <a:r>
+              <a:rPr lang="en-US" sz="3600" b="1" dirty="0">
+                <a:solidFill>
+                  <a:srgbClr val="000000"/>
+                </a:solidFill>
+                <a:effectLst>
+                  <a:outerShdw blurRad="38100" dist="38100" dir="2700000" algn="tl">
+                    <a:srgbClr val="000000">
+                      <a:alpha val="43137"/>
+                    </a:srgbClr>
+                  </a:outerShdw>
+                </a:effectLst>
+              </a:rPr>
+              <a:t>MADISON, WI</a:t>
+            </a:r>
+          </a:p>
+        </p:txBody>
+      </p:sp>
+    </p:spTree>
+    <p:extLst>
+      <p:ext uri="{BB962C8B-B14F-4D97-AF65-F5344CB8AC3E}">
+        <p14:creationId xmlns:p14="http://schemas.microsoft.com/office/powerpoint/2010/main" val="864156642"/>
       </p:ext>
     </p:extLst>
   </p:cSld>

</xml_diff>